<commit_message>
Update PRCO204 Group Presentation 2.pptx
updated presentation
</commit_message>
<xml_diff>
--- a/Documents/Presentations/PRCO204 Group Presentation 2.pptx
+++ b/Documents/Presentations/PRCO204 Group Presentation 2.pptx
@@ -5,18 +5,17 @@
     <p:sldMasterId id="2147483648" r:id="rId1"/>
   </p:sldMasterIdLst>
   <p:notesMasterIdLst>
-    <p:notesMasterId r:id="rId11"/>
+    <p:notesMasterId r:id="rId10"/>
   </p:notesMasterIdLst>
   <p:sldIdLst>
     <p:sldId id="256" r:id="rId2"/>
     <p:sldId id="257" r:id="rId3"/>
-    <p:sldId id="264" r:id="rId4"/>
-    <p:sldId id="265" r:id="rId5"/>
-    <p:sldId id="267" r:id="rId6"/>
-    <p:sldId id="266" r:id="rId7"/>
-    <p:sldId id="261" r:id="rId8"/>
-    <p:sldId id="262" r:id="rId9"/>
-    <p:sldId id="263" r:id="rId10"/>
+    <p:sldId id="268" r:id="rId4"/>
+    <p:sldId id="269" r:id="rId5"/>
+    <p:sldId id="270" r:id="rId6"/>
+    <p:sldId id="264" r:id="rId7"/>
+    <p:sldId id="267" r:id="rId8"/>
+    <p:sldId id="263" r:id="rId9"/>
   </p:sldIdLst>
   <p:sldSz cx="12192000" cy="6858000"/>
   <p:notesSz cx="6858000" cy="9144000"/>
@@ -205,7 +204,7 @@
           <a:p>
             <a:fld id="{3BD742AD-520A-47F7-B2C9-40E93A8FC620}" type="datetimeFigureOut">
               <a:rPr lang="en-GB" smtClean="0"/>
-              <a:t>19/02/2020</a:t>
+              <a:t>04/03/2020</a:t>
             </a:fld>
             <a:endParaRPr lang="en-GB"/>
           </a:p>
@@ -652,7 +651,7 @@
           <a:p>
             <a:fld id="{C0B17FCB-F812-4DC3-A3DE-7A40917F3657}" type="datetimeFigureOut">
               <a:rPr lang="en-GB" smtClean="0"/>
-              <a:t>19/02/2020</a:t>
+              <a:t>04/03/2020</a:t>
             </a:fld>
             <a:endParaRPr lang="en-GB"/>
           </a:p>
@@ -852,7 +851,7 @@
           <a:p>
             <a:fld id="{C0B17FCB-F812-4DC3-A3DE-7A40917F3657}" type="datetimeFigureOut">
               <a:rPr lang="en-GB" smtClean="0"/>
-              <a:t>19/02/2020</a:t>
+              <a:t>04/03/2020</a:t>
             </a:fld>
             <a:endParaRPr lang="en-GB"/>
           </a:p>
@@ -1062,7 +1061,7 @@
           <a:p>
             <a:fld id="{C0B17FCB-F812-4DC3-A3DE-7A40917F3657}" type="datetimeFigureOut">
               <a:rPr lang="en-GB" smtClean="0"/>
-              <a:t>19/02/2020</a:t>
+              <a:t>04/03/2020</a:t>
             </a:fld>
             <a:endParaRPr lang="en-GB"/>
           </a:p>
@@ -1397,7 +1396,7 @@
           <a:p>
             <a:fld id="{C0B17FCB-F812-4DC3-A3DE-7A40917F3657}" type="datetimeFigureOut">
               <a:rPr lang="en-GB" smtClean="0"/>
-              <a:t>19/02/2020</a:t>
+              <a:t>04/03/2020</a:t>
             </a:fld>
             <a:endParaRPr lang="en-GB"/>
           </a:p>
@@ -1740,7 +1739,7 @@
           <a:p>
             <a:fld id="{C0B17FCB-F812-4DC3-A3DE-7A40917F3657}" type="datetimeFigureOut">
               <a:rPr lang="en-GB" smtClean="0"/>
-              <a:t>19/02/2020</a:t>
+              <a:t>04/03/2020</a:t>
             </a:fld>
             <a:endParaRPr lang="en-GB"/>
           </a:p>
@@ -2008,7 +2007,7 @@
           <a:p>
             <a:fld id="{C0B17FCB-F812-4DC3-A3DE-7A40917F3657}" type="datetimeFigureOut">
               <a:rPr lang="en-GB" smtClean="0"/>
-              <a:t>19/02/2020</a:t>
+              <a:t>04/03/2020</a:t>
             </a:fld>
             <a:endParaRPr lang="en-GB"/>
           </a:p>
@@ -2423,7 +2422,7 @@
           <a:p>
             <a:fld id="{C0B17FCB-F812-4DC3-A3DE-7A40917F3657}" type="datetimeFigureOut">
               <a:rPr lang="en-GB" smtClean="0"/>
-              <a:t>19/02/2020</a:t>
+              <a:t>04/03/2020</a:t>
             </a:fld>
             <a:endParaRPr lang="en-GB"/>
           </a:p>
@@ -2565,7 +2564,7 @@
           <a:p>
             <a:fld id="{C0B17FCB-F812-4DC3-A3DE-7A40917F3657}" type="datetimeFigureOut">
               <a:rPr lang="en-GB" smtClean="0"/>
-              <a:t>19/02/2020</a:t>
+              <a:t>04/03/2020</a:t>
             </a:fld>
             <a:endParaRPr lang="en-GB"/>
           </a:p>
@@ -2678,7 +2677,7 @@
           <a:p>
             <a:fld id="{C0B17FCB-F812-4DC3-A3DE-7A40917F3657}" type="datetimeFigureOut">
               <a:rPr lang="en-GB" smtClean="0"/>
-              <a:t>19/02/2020</a:t>
+              <a:t>04/03/2020</a:t>
             </a:fld>
             <a:endParaRPr lang="en-GB"/>
           </a:p>
@@ -2991,7 +2990,7 @@
           <a:p>
             <a:fld id="{C0B17FCB-F812-4DC3-A3DE-7A40917F3657}" type="datetimeFigureOut">
               <a:rPr lang="en-GB" smtClean="0"/>
-              <a:t>19/02/2020</a:t>
+              <a:t>04/03/2020</a:t>
             </a:fld>
             <a:endParaRPr lang="en-GB"/>
           </a:p>
@@ -3280,7 +3279,7 @@
           <a:p>
             <a:fld id="{C0B17FCB-F812-4DC3-A3DE-7A40917F3657}" type="datetimeFigureOut">
               <a:rPr lang="en-GB" smtClean="0"/>
-              <a:t>19/02/2020</a:t>
+              <a:t>04/03/2020</a:t>
             </a:fld>
             <a:endParaRPr lang="en-GB"/>
           </a:p>
@@ -3539,7 +3538,7 @@
           <a:p>
             <a:fld id="{C0B17FCB-F812-4DC3-A3DE-7A40917F3657}" type="datetimeFigureOut">
               <a:rPr lang="en-GB" smtClean="0"/>
-              <a:t>19/02/2020</a:t>
+              <a:t>04/03/2020</a:t>
             </a:fld>
             <a:endParaRPr lang="en-GB"/>
           </a:p>
@@ -4028,6 +4027,26 @@
 <file path=ppt/slides/slide2.xml><?xml version="1.0" encoding="utf-8"?>
 <p:sld xmlns:a="http://schemas.openxmlformats.org/drawingml/2006/main" xmlns:r="http://schemas.openxmlformats.org/officeDocument/2006/relationships" xmlns:p="http://schemas.openxmlformats.org/presentationml/2006/main">
   <p:cSld>
+    <p:bg>
+      <p:bgPr>
+        <a:gradFill>
+          <a:gsLst>
+            <a:gs pos="100000">
+              <a:schemeClr val="accent1">
+                <a:lumMod val="75000"/>
+              </a:schemeClr>
+            </a:gs>
+            <a:gs pos="0">
+              <a:schemeClr val="accent5">
+                <a:lumMod val="75000"/>
+              </a:schemeClr>
+            </a:gs>
+          </a:gsLst>
+          <a:lin ang="5400000" scaled="1"/>
+        </a:gradFill>
+        <a:effectLst/>
+      </p:bgPr>
+    </p:bg>
     <p:spTree>
       <p:nvGrpSpPr>
         <p:cNvPr id="1" name=""/>
@@ -4065,7 +4084,7 @@
           <a:p>
             <a:r>
               <a:rPr lang="en-GB" dirty="0"/>
-              <a:t>Project Vision</a:t>
+              <a:t>Product Goals</a:t>
             </a:r>
           </a:p>
         </p:txBody>
@@ -4102,12 +4121,101 @@
               <a:t>Administrators can create and remove flights; they can also view the audit log, send secure messages to customers and run statistics for business purposes</a:t>
             </a:r>
           </a:p>
+          <a:p>
+            <a:endParaRPr lang="en-GB" dirty="0"/>
+          </a:p>
         </p:txBody>
       </p:sp>
     </p:spTree>
     <p:extLst>
       <p:ext uri="{BB962C8B-B14F-4D97-AF65-F5344CB8AC3E}">
         <p14:creationId xmlns:p14="http://schemas.microsoft.com/office/powerpoint/2010/main" val="1117230992"/>
+      </p:ext>
+    </p:extLst>
+  </p:cSld>
+  <p:clrMapOvr>
+    <a:overrideClrMapping bg1="lt1" tx1="dk1" bg2="lt2" tx2="dk2" accent1="accent1" accent2="accent2" accent3="accent3" accent4="accent4" accent5="accent5" accent6="accent6" hlink="hlink" folHlink="folHlink"/>
+  </p:clrMapOvr>
+</p:sld>
+</file>
+
+<file path=ppt/slides/slide3.xml><?xml version="1.0" encoding="utf-8"?>
+<p:sld xmlns:a="http://schemas.openxmlformats.org/drawingml/2006/main" xmlns:r="http://schemas.openxmlformats.org/officeDocument/2006/relationships" xmlns:p="http://schemas.openxmlformats.org/presentationml/2006/main">
+  <p:cSld>
+    <p:spTree>
+      <p:nvGrpSpPr>
+        <p:cNvPr id="1" name=""/>
+        <p:cNvGrpSpPr/>
+        <p:nvPr/>
+      </p:nvGrpSpPr>
+      <p:grpSpPr>
+        <a:xfrm>
+          <a:off x="0" y="0"/>
+          <a:ext cx="0" cy="0"/>
+          <a:chOff x="0" y="0"/>
+          <a:chExt cx="0" cy="0"/>
+        </a:xfrm>
+      </p:grpSpPr>
+      <p:sp>
+        <p:nvSpPr>
+          <p:cNvPr id="2" name="Title 1">
+            <a:extLst>
+              <a:ext uri="{FF2B5EF4-FFF2-40B4-BE49-F238E27FC236}">
+                <a16:creationId xmlns:a16="http://schemas.microsoft.com/office/drawing/2014/main" id="{D7128E3B-18DE-424A-9FCE-07667EBEA289}"/>
+              </a:ext>
+            </a:extLst>
+          </p:cNvPr>
+          <p:cNvSpPr>
+            <a:spLocks noGrp="1"/>
+          </p:cNvSpPr>
+          <p:nvPr>
+            <p:ph type="title"/>
+          </p:nvPr>
+        </p:nvSpPr>
+        <p:spPr/>
+        <p:txBody>
+          <a:bodyPr/>
+          <a:lstStyle/>
+          <a:p>
+            <a:r>
+              <a:rPr lang="en-GB" dirty="0"/>
+              <a:t>Backlog</a:t>
+            </a:r>
+          </a:p>
+        </p:txBody>
+      </p:sp>
+      <p:sp>
+        <p:nvSpPr>
+          <p:cNvPr id="3" name="Content Placeholder 2">
+            <a:extLst>
+              <a:ext uri="{FF2B5EF4-FFF2-40B4-BE49-F238E27FC236}">
+                <a16:creationId xmlns:a16="http://schemas.microsoft.com/office/drawing/2014/main" id="{4B2A85D3-2A27-45AF-8935-A9709A43ED1F}"/>
+              </a:ext>
+            </a:extLst>
+          </p:cNvPr>
+          <p:cNvSpPr>
+            <a:spLocks noGrp="1"/>
+          </p:cNvSpPr>
+          <p:nvPr>
+            <p:ph idx="1"/>
+          </p:nvPr>
+        </p:nvSpPr>
+        <p:spPr/>
+        <p:txBody>
+          <a:bodyPr/>
+          <a:lstStyle/>
+          <a:p>
+            <a:r>
+              <a:rPr lang="en-GB" dirty="0"/>
+              <a:t>https://github.com/Plymouth-University/prco204-flight-crew/projects/2</a:t>
+            </a:r>
+          </a:p>
+        </p:txBody>
+      </p:sp>
+    </p:spTree>
+    <p:extLst>
+      <p:ext uri="{BB962C8B-B14F-4D97-AF65-F5344CB8AC3E}">
+        <p14:creationId xmlns:p14="http://schemas.microsoft.com/office/powerpoint/2010/main" val="1913028321"/>
       </p:ext>
     </p:extLst>
   </p:cSld>
@@ -4117,7 +4225,176 @@
 </p:sld>
 </file>
 
-<file path=ppt/slides/slide3.xml><?xml version="1.0" encoding="utf-8"?>
+<file path=ppt/slides/slide4.xml><?xml version="1.0" encoding="utf-8"?>
+<p:sld xmlns:a="http://schemas.openxmlformats.org/drawingml/2006/main" xmlns:r="http://schemas.openxmlformats.org/officeDocument/2006/relationships" xmlns:p="http://schemas.openxmlformats.org/presentationml/2006/main">
+  <p:cSld>
+    <p:spTree>
+      <p:nvGrpSpPr>
+        <p:cNvPr id="1" name=""/>
+        <p:cNvGrpSpPr/>
+        <p:nvPr/>
+      </p:nvGrpSpPr>
+      <p:grpSpPr>
+        <a:xfrm>
+          <a:off x="0" y="0"/>
+          <a:ext cx="0" cy="0"/>
+          <a:chOff x="0" y="0"/>
+          <a:chExt cx="0" cy="0"/>
+        </a:xfrm>
+      </p:grpSpPr>
+      <p:sp>
+        <p:nvSpPr>
+          <p:cNvPr id="2" name="Title 1">
+            <a:extLst>
+              <a:ext uri="{FF2B5EF4-FFF2-40B4-BE49-F238E27FC236}">
+                <a16:creationId xmlns:a16="http://schemas.microsoft.com/office/drawing/2014/main" id="{BBFD5FB7-62AD-4F1F-B617-6774570CDD92}"/>
+              </a:ext>
+            </a:extLst>
+          </p:cNvPr>
+          <p:cNvSpPr>
+            <a:spLocks noGrp="1"/>
+          </p:cNvSpPr>
+          <p:nvPr>
+            <p:ph type="title"/>
+          </p:nvPr>
+        </p:nvSpPr>
+        <p:spPr/>
+        <p:txBody>
+          <a:bodyPr/>
+          <a:lstStyle/>
+          <a:p>
+            <a:r>
+              <a:rPr lang="en-GB" dirty="0"/>
+              <a:t>Sprint Planning</a:t>
+            </a:r>
+          </a:p>
+        </p:txBody>
+      </p:sp>
+      <p:sp>
+        <p:nvSpPr>
+          <p:cNvPr id="3" name="Content Placeholder 2">
+            <a:extLst>
+              <a:ext uri="{FF2B5EF4-FFF2-40B4-BE49-F238E27FC236}">
+                <a16:creationId xmlns:a16="http://schemas.microsoft.com/office/drawing/2014/main" id="{D001DBE7-67DF-4AA8-8E31-BE66D1342B48}"/>
+              </a:ext>
+            </a:extLst>
+          </p:cNvPr>
+          <p:cNvSpPr>
+            <a:spLocks noGrp="1"/>
+          </p:cNvSpPr>
+          <p:nvPr>
+            <p:ph idx="1"/>
+          </p:nvPr>
+        </p:nvSpPr>
+        <p:spPr/>
+        <p:txBody>
+          <a:bodyPr/>
+          <a:lstStyle/>
+          <a:p>
+            <a:r>
+              <a:rPr lang="en-GB" dirty="0"/>
+              <a:t>Sprint Documents</a:t>
+            </a:r>
+          </a:p>
+        </p:txBody>
+      </p:sp>
+    </p:spTree>
+    <p:extLst>
+      <p:ext uri="{BB962C8B-B14F-4D97-AF65-F5344CB8AC3E}">
+        <p14:creationId xmlns:p14="http://schemas.microsoft.com/office/powerpoint/2010/main" val="1225627463"/>
+      </p:ext>
+    </p:extLst>
+  </p:cSld>
+  <p:clrMapOvr>
+    <a:masterClrMapping/>
+  </p:clrMapOvr>
+</p:sld>
+</file>
+
+<file path=ppt/slides/slide5.xml><?xml version="1.0" encoding="utf-8"?>
+<p:sld xmlns:a="http://schemas.openxmlformats.org/drawingml/2006/main" xmlns:r="http://schemas.openxmlformats.org/officeDocument/2006/relationships" xmlns:p="http://schemas.openxmlformats.org/presentationml/2006/main">
+  <p:cSld>
+    <p:spTree>
+      <p:nvGrpSpPr>
+        <p:cNvPr id="1" name=""/>
+        <p:cNvGrpSpPr/>
+        <p:nvPr/>
+      </p:nvGrpSpPr>
+      <p:grpSpPr>
+        <a:xfrm>
+          <a:off x="0" y="0"/>
+          <a:ext cx="0" cy="0"/>
+          <a:chOff x="0" y="0"/>
+          <a:chExt cx="0" cy="0"/>
+        </a:xfrm>
+      </p:grpSpPr>
+      <p:sp>
+        <p:nvSpPr>
+          <p:cNvPr id="2" name="Title 1">
+            <a:extLst>
+              <a:ext uri="{FF2B5EF4-FFF2-40B4-BE49-F238E27FC236}">
+                <a16:creationId xmlns:a16="http://schemas.microsoft.com/office/drawing/2014/main" id="{5399851E-FD90-427A-B00D-729037E009C0}"/>
+              </a:ext>
+            </a:extLst>
+          </p:cNvPr>
+          <p:cNvSpPr>
+            <a:spLocks noGrp="1"/>
+          </p:cNvSpPr>
+          <p:nvPr>
+            <p:ph type="title"/>
+          </p:nvPr>
+        </p:nvSpPr>
+        <p:spPr/>
+        <p:txBody>
+          <a:bodyPr/>
+          <a:lstStyle/>
+          <a:p>
+            <a:r>
+              <a:rPr lang="en-GB" dirty="0"/>
+              <a:t>Product Demo</a:t>
+            </a:r>
+          </a:p>
+        </p:txBody>
+      </p:sp>
+      <p:sp>
+        <p:nvSpPr>
+          <p:cNvPr id="3" name="Content Placeholder 2">
+            <a:extLst>
+              <a:ext uri="{FF2B5EF4-FFF2-40B4-BE49-F238E27FC236}">
+                <a16:creationId xmlns:a16="http://schemas.microsoft.com/office/drawing/2014/main" id="{E1FA8661-64E2-48BB-86D2-77BBBFE9AAD0}"/>
+              </a:ext>
+            </a:extLst>
+          </p:cNvPr>
+          <p:cNvSpPr>
+            <a:spLocks noGrp="1"/>
+          </p:cNvSpPr>
+          <p:nvPr>
+            <p:ph idx="1"/>
+          </p:nvPr>
+        </p:nvSpPr>
+        <p:spPr/>
+        <p:txBody>
+          <a:bodyPr/>
+          <a:lstStyle/>
+          <a:p>
+            <a:endParaRPr lang="en-GB"/>
+          </a:p>
+        </p:txBody>
+      </p:sp>
+    </p:spTree>
+    <p:extLst>
+      <p:ext uri="{BB962C8B-B14F-4D97-AF65-F5344CB8AC3E}">
+        <p14:creationId xmlns:p14="http://schemas.microsoft.com/office/powerpoint/2010/main" val="3328914800"/>
+      </p:ext>
+    </p:extLst>
+  </p:cSld>
+  <p:clrMapOvr>
+    <a:masterClrMapping/>
+  </p:clrMapOvr>
+</p:sld>
+</file>
+
+<file path=ppt/slides/slide6.xml><?xml version="1.0" encoding="utf-8"?>
 <p:sld xmlns:a="http://schemas.openxmlformats.org/drawingml/2006/main" xmlns:r="http://schemas.openxmlformats.org/officeDocument/2006/relationships" xmlns:p="http://schemas.openxmlformats.org/presentationml/2006/main">
   <p:cSld>
     <p:spTree>
@@ -6213,7 +6490,7 @@
 </p:sld>
 </file>
 
-<file path=ppt/slides/slide4.xml><?xml version="1.0" encoding="utf-8"?>
+<file path=ppt/slides/slide7.xml><?xml version="1.0" encoding="utf-8"?>
 <p:sld xmlns:a="http://schemas.openxmlformats.org/drawingml/2006/main" xmlns:r="http://schemas.openxmlformats.org/officeDocument/2006/relationships" xmlns:p="http://schemas.openxmlformats.org/presentationml/2006/main">
   <p:cSld>
     <p:spTree>
@@ -6235,7 +6512,7 @@
           <p:cNvPr id="2" name="Title 1">
             <a:extLst>
               <a:ext uri="{FF2B5EF4-FFF2-40B4-BE49-F238E27FC236}">
-                <a16:creationId xmlns:a16="http://schemas.microsoft.com/office/drawing/2014/main" id="{2DE6455C-2B87-49DD-B8AB-6F74061EEC7E}"/>
+                <a16:creationId xmlns:a16="http://schemas.microsoft.com/office/drawing/2014/main" id="{EF431E20-CF03-4A3D-9423-7904A2B23333}"/>
               </a:ext>
             </a:extLst>
           </p:cNvPr>
@@ -6253,980 +6530,6 @@
           <a:p>
             <a:r>
               <a:rPr lang="en-GB" dirty="0"/>
-              <a:t>Story Map</a:t>
-            </a:r>
-          </a:p>
-        </p:txBody>
-      </p:sp>
-      <p:sp>
-        <p:nvSpPr>
-          <p:cNvPr id="4" name="TextBox 3">
-            <a:extLst>
-              <a:ext uri="{FF2B5EF4-FFF2-40B4-BE49-F238E27FC236}">
-                <a16:creationId xmlns:a16="http://schemas.microsoft.com/office/drawing/2014/main" id="{4C45B761-431C-4F74-8EAA-32576AA4A03D}"/>
-              </a:ext>
-            </a:extLst>
-          </p:cNvPr>
-          <p:cNvSpPr txBox="1"/>
-          <p:nvPr/>
-        </p:nvSpPr>
-        <p:spPr>
-          <a:xfrm>
-            <a:off x="671120" y="1371599"/>
-            <a:ext cx="1132514" cy="4524315"/>
-          </a:xfrm>
-          <a:prstGeom prst="rect">
-            <a:avLst/>
-          </a:prstGeom>
-          <a:noFill/>
-        </p:spPr>
-        <p:txBody>
-          <a:bodyPr wrap="square" rtlCol="0">
-            <a:spAutoFit/>
-          </a:bodyPr>
-          <a:lstStyle/>
-          <a:p>
-            <a:r>
-              <a:rPr lang="en-GB" dirty="0">
-                <a:solidFill>
-                  <a:schemeClr val="bg1"/>
-                </a:solidFill>
-              </a:rPr>
-              <a:t>User activities</a:t>
-            </a:r>
-          </a:p>
-          <a:p>
-            <a:endParaRPr lang="en-GB" dirty="0">
-              <a:solidFill>
-                <a:schemeClr val="bg1"/>
-              </a:solidFill>
-            </a:endParaRPr>
-          </a:p>
-          <a:p>
-            <a:r>
-              <a:rPr lang="en-GB" dirty="0">
-                <a:solidFill>
-                  <a:schemeClr val="bg1"/>
-                </a:solidFill>
-              </a:rPr>
-              <a:t>User tasks</a:t>
-            </a:r>
-          </a:p>
-          <a:p>
-            <a:endParaRPr lang="en-GB" dirty="0">
-              <a:solidFill>
-                <a:schemeClr val="bg1"/>
-              </a:solidFill>
-            </a:endParaRPr>
-          </a:p>
-          <a:p>
-            <a:endParaRPr lang="en-GB" dirty="0">
-              <a:solidFill>
-                <a:schemeClr val="bg1"/>
-              </a:solidFill>
-            </a:endParaRPr>
-          </a:p>
-          <a:p>
-            <a:r>
-              <a:rPr lang="en-GB" dirty="0">
-                <a:solidFill>
-                  <a:schemeClr val="bg1"/>
-                </a:solidFill>
-              </a:rPr>
-              <a:t>User stories</a:t>
-            </a:r>
-          </a:p>
-          <a:p>
-            <a:endParaRPr lang="en-GB" dirty="0">
-              <a:solidFill>
-                <a:schemeClr val="bg1"/>
-              </a:solidFill>
-            </a:endParaRPr>
-          </a:p>
-          <a:p>
-            <a:endParaRPr lang="en-GB" dirty="0">
-              <a:solidFill>
-                <a:schemeClr val="bg1"/>
-              </a:solidFill>
-            </a:endParaRPr>
-          </a:p>
-          <a:p>
-            <a:endParaRPr lang="en-GB" dirty="0">
-              <a:solidFill>
-                <a:schemeClr val="bg1"/>
-              </a:solidFill>
-            </a:endParaRPr>
-          </a:p>
-          <a:p>
-            <a:endParaRPr lang="en-GB" dirty="0">
-              <a:solidFill>
-                <a:schemeClr val="bg1"/>
-              </a:solidFill>
-            </a:endParaRPr>
-          </a:p>
-          <a:p>
-            <a:endParaRPr lang="en-GB" dirty="0">
-              <a:solidFill>
-                <a:schemeClr val="bg1"/>
-              </a:solidFill>
-            </a:endParaRPr>
-          </a:p>
-          <a:p>
-            <a:endParaRPr lang="en-GB" dirty="0">
-              <a:solidFill>
-                <a:schemeClr val="bg1"/>
-              </a:solidFill>
-            </a:endParaRPr>
-          </a:p>
-          <a:p>
-            <a:endParaRPr lang="en-GB" dirty="0">
-              <a:solidFill>
-                <a:schemeClr val="bg1"/>
-              </a:solidFill>
-            </a:endParaRPr>
-          </a:p>
-          <a:p>
-            <a:endParaRPr lang="en-GB" dirty="0">
-              <a:solidFill>
-                <a:schemeClr val="bg1"/>
-              </a:solidFill>
-            </a:endParaRPr>
-          </a:p>
-        </p:txBody>
-      </p:sp>
-      <p:sp>
-        <p:nvSpPr>
-          <p:cNvPr id="5" name="TextBox 4">
-            <a:extLst>
-              <a:ext uri="{FF2B5EF4-FFF2-40B4-BE49-F238E27FC236}">
-                <a16:creationId xmlns:a16="http://schemas.microsoft.com/office/drawing/2014/main" id="{027AD365-E1A6-4BF7-9373-D2F79EB38F9B}"/>
-              </a:ext>
-            </a:extLst>
-          </p:cNvPr>
-          <p:cNvSpPr txBox="1"/>
-          <p:nvPr/>
-        </p:nvSpPr>
-        <p:spPr>
-          <a:xfrm>
-            <a:off x="3302466" y="1413577"/>
-            <a:ext cx="1536582" cy="646331"/>
-          </a:xfrm>
-          <a:prstGeom prst="rect">
-            <a:avLst/>
-          </a:prstGeom>
-          <a:noFill/>
-        </p:spPr>
-        <p:txBody>
-          <a:bodyPr wrap="square" rtlCol="0">
-            <a:spAutoFit/>
-          </a:bodyPr>
-          <a:lstStyle/>
-          <a:p>
-            <a:r>
-              <a:rPr lang="en-GB" dirty="0">
-                <a:solidFill>
-                  <a:schemeClr val="bg1"/>
-                </a:solidFill>
-              </a:rPr>
-              <a:t>Flight management</a:t>
-            </a:r>
-          </a:p>
-        </p:txBody>
-      </p:sp>
-      <p:sp>
-        <p:nvSpPr>
-          <p:cNvPr id="6" name="TextBox 5">
-            <a:extLst>
-              <a:ext uri="{FF2B5EF4-FFF2-40B4-BE49-F238E27FC236}">
-                <a16:creationId xmlns:a16="http://schemas.microsoft.com/office/drawing/2014/main" id="{71038A87-02C1-44AB-8398-20852E0371E1}"/>
-              </a:ext>
-            </a:extLst>
-          </p:cNvPr>
-          <p:cNvSpPr txBox="1"/>
-          <p:nvPr/>
-        </p:nvSpPr>
-        <p:spPr>
-          <a:xfrm>
-            <a:off x="2462171" y="2326290"/>
-            <a:ext cx="3015840" cy="307777"/>
-          </a:xfrm>
-          <a:prstGeom prst="rect">
-            <a:avLst/>
-          </a:prstGeom>
-          <a:noFill/>
-        </p:spPr>
-        <p:txBody>
-          <a:bodyPr wrap="square" rtlCol="0">
-            <a:spAutoFit/>
-          </a:bodyPr>
-          <a:lstStyle/>
-          <a:p>
-            <a:r>
-              <a:rPr lang="en-GB" sz="1400" dirty="0">
-                <a:solidFill>
-                  <a:schemeClr val="bg1"/>
-                </a:solidFill>
-              </a:rPr>
-              <a:t>Search / Book / Cancel / Pay for a flight</a:t>
-            </a:r>
-          </a:p>
-        </p:txBody>
-      </p:sp>
-      <p:sp>
-        <p:nvSpPr>
-          <p:cNvPr id="7" name="TextBox 6">
-            <a:extLst>
-              <a:ext uri="{FF2B5EF4-FFF2-40B4-BE49-F238E27FC236}">
-                <a16:creationId xmlns:a16="http://schemas.microsoft.com/office/drawing/2014/main" id="{E1C6D520-951B-4A8F-89F0-645DBB997D02}"/>
-              </a:ext>
-            </a:extLst>
-          </p:cNvPr>
-          <p:cNvSpPr txBox="1"/>
-          <p:nvPr/>
-        </p:nvSpPr>
-        <p:spPr>
-          <a:xfrm>
-            <a:off x="5568892" y="1371599"/>
-            <a:ext cx="1536582" cy="646331"/>
-          </a:xfrm>
-          <a:prstGeom prst="rect">
-            <a:avLst/>
-          </a:prstGeom>
-          <a:noFill/>
-        </p:spPr>
-        <p:txBody>
-          <a:bodyPr wrap="square" rtlCol="0">
-            <a:spAutoFit/>
-          </a:bodyPr>
-          <a:lstStyle/>
-          <a:p>
-            <a:r>
-              <a:rPr lang="en-GB" dirty="0">
-                <a:solidFill>
-                  <a:schemeClr val="bg1"/>
-                </a:solidFill>
-              </a:rPr>
-              <a:t>Account management</a:t>
-            </a:r>
-          </a:p>
-        </p:txBody>
-      </p:sp>
-      <p:sp>
-        <p:nvSpPr>
-          <p:cNvPr id="8" name="TextBox 7">
-            <a:extLst>
-              <a:ext uri="{FF2B5EF4-FFF2-40B4-BE49-F238E27FC236}">
-                <a16:creationId xmlns:a16="http://schemas.microsoft.com/office/drawing/2014/main" id="{E579A0CC-ADC6-42CE-9875-6227F50BC3D5}"/>
-              </a:ext>
-            </a:extLst>
-          </p:cNvPr>
-          <p:cNvSpPr txBox="1"/>
-          <p:nvPr/>
-        </p:nvSpPr>
-        <p:spPr>
-          <a:xfrm>
-            <a:off x="5652081" y="2316441"/>
-            <a:ext cx="1347135" cy="523220"/>
-          </a:xfrm>
-          <a:prstGeom prst="rect">
-            <a:avLst/>
-          </a:prstGeom>
-          <a:noFill/>
-        </p:spPr>
-        <p:txBody>
-          <a:bodyPr wrap="square" rtlCol="0">
-            <a:spAutoFit/>
-          </a:bodyPr>
-          <a:lstStyle/>
-          <a:p>
-            <a:r>
-              <a:rPr lang="en-GB" sz="1400" dirty="0">
-                <a:solidFill>
-                  <a:schemeClr val="bg1"/>
-                </a:solidFill>
-              </a:rPr>
-              <a:t>Create / Delete account</a:t>
-            </a:r>
-          </a:p>
-        </p:txBody>
-      </p:sp>
-      <p:sp>
-        <p:nvSpPr>
-          <p:cNvPr id="9" name="TextBox 8">
-            <a:extLst>
-              <a:ext uri="{FF2B5EF4-FFF2-40B4-BE49-F238E27FC236}">
-                <a16:creationId xmlns:a16="http://schemas.microsoft.com/office/drawing/2014/main" id="{1C51A210-5C88-44B5-A146-5D35065C9FCC}"/>
-              </a:ext>
-            </a:extLst>
-          </p:cNvPr>
-          <p:cNvSpPr txBox="1"/>
-          <p:nvPr/>
-        </p:nvSpPr>
-        <p:spPr>
-          <a:xfrm>
-            <a:off x="9047527" y="1413577"/>
-            <a:ext cx="914400" cy="369332"/>
-          </a:xfrm>
-          <a:prstGeom prst="rect">
-            <a:avLst/>
-          </a:prstGeom>
-          <a:noFill/>
-        </p:spPr>
-        <p:txBody>
-          <a:bodyPr wrap="square" rtlCol="0">
-            <a:spAutoFit/>
-          </a:bodyPr>
-          <a:lstStyle/>
-          <a:p>
-            <a:r>
-              <a:rPr lang="en-GB" dirty="0">
-                <a:solidFill>
-                  <a:schemeClr val="bg1"/>
-                </a:solidFill>
-              </a:rPr>
-              <a:t>Admin</a:t>
-            </a:r>
-          </a:p>
-        </p:txBody>
-      </p:sp>
-      <p:sp>
-        <p:nvSpPr>
-          <p:cNvPr id="10" name="TextBox 9">
-            <a:extLst>
-              <a:ext uri="{FF2B5EF4-FFF2-40B4-BE49-F238E27FC236}">
-                <a16:creationId xmlns:a16="http://schemas.microsoft.com/office/drawing/2014/main" id="{EA7C2083-BDDC-48A5-923D-3CAF404B512C}"/>
-              </a:ext>
-            </a:extLst>
-          </p:cNvPr>
-          <p:cNvSpPr txBox="1"/>
-          <p:nvPr/>
-        </p:nvSpPr>
-        <p:spPr>
-          <a:xfrm>
-            <a:off x="7835318" y="2281939"/>
-            <a:ext cx="1669409" cy="523220"/>
-          </a:xfrm>
-          <a:prstGeom prst="rect">
-            <a:avLst/>
-          </a:prstGeom>
-          <a:noFill/>
-        </p:spPr>
-        <p:txBody>
-          <a:bodyPr wrap="square" rtlCol="0">
-            <a:spAutoFit/>
-          </a:bodyPr>
-          <a:lstStyle/>
-          <a:p>
-            <a:r>
-              <a:rPr lang="en-GB" sz="1400" dirty="0">
-                <a:solidFill>
-                  <a:schemeClr val="bg1"/>
-                </a:solidFill>
-              </a:rPr>
-              <a:t>Add/remove/check flights</a:t>
-            </a:r>
-          </a:p>
-        </p:txBody>
-      </p:sp>
-      <p:sp>
-        <p:nvSpPr>
-          <p:cNvPr id="11" name="TextBox 10">
-            <a:extLst>
-              <a:ext uri="{FF2B5EF4-FFF2-40B4-BE49-F238E27FC236}">
-                <a16:creationId xmlns:a16="http://schemas.microsoft.com/office/drawing/2014/main" id="{A682DCBD-5B74-4FF6-BD91-1CC17BC4F182}"/>
-              </a:ext>
-            </a:extLst>
-          </p:cNvPr>
-          <p:cNvSpPr txBox="1"/>
-          <p:nvPr/>
-        </p:nvSpPr>
-        <p:spPr>
-          <a:xfrm>
-            <a:off x="9504727" y="2100997"/>
-            <a:ext cx="1449194" cy="738664"/>
-          </a:xfrm>
-          <a:prstGeom prst="rect">
-            <a:avLst/>
-          </a:prstGeom>
-          <a:noFill/>
-        </p:spPr>
-        <p:txBody>
-          <a:bodyPr wrap="square" rtlCol="0">
-            <a:spAutoFit/>
-          </a:bodyPr>
-          <a:lstStyle/>
-          <a:p>
-            <a:r>
-              <a:rPr lang="en-GB" sz="1400" dirty="0">
-                <a:solidFill>
-                  <a:schemeClr val="bg1"/>
-                </a:solidFill>
-              </a:rPr>
-              <a:t>View audit logs / send a secure message</a:t>
-            </a:r>
-          </a:p>
-        </p:txBody>
-      </p:sp>
-      <p:sp>
-        <p:nvSpPr>
-          <p:cNvPr id="12" name="TextBox 11">
-            <a:extLst>
-              <a:ext uri="{FF2B5EF4-FFF2-40B4-BE49-F238E27FC236}">
-                <a16:creationId xmlns:a16="http://schemas.microsoft.com/office/drawing/2014/main" id="{E4AA30FE-4DFD-4E9E-A597-F6272722C2A7}"/>
-              </a:ext>
-            </a:extLst>
-          </p:cNvPr>
-          <p:cNvSpPr txBox="1"/>
-          <p:nvPr/>
-        </p:nvSpPr>
-        <p:spPr>
-          <a:xfrm>
-            <a:off x="3302466" y="3062310"/>
-            <a:ext cx="1132513" cy="830997"/>
-          </a:xfrm>
-          <a:prstGeom prst="rect">
-            <a:avLst/>
-          </a:prstGeom>
-          <a:noFill/>
-        </p:spPr>
-        <p:txBody>
-          <a:bodyPr wrap="square" rtlCol="0">
-            <a:spAutoFit/>
-          </a:bodyPr>
-          <a:lstStyle/>
-          <a:p>
-            <a:r>
-              <a:rPr lang="en-GB" sz="1200" dirty="0">
-                <a:solidFill>
-                  <a:schemeClr val="bg1"/>
-                </a:solidFill>
-              </a:rPr>
-              <a:t>Customer logs in, searches for an then books a flight</a:t>
-            </a:r>
-          </a:p>
-        </p:txBody>
-      </p:sp>
-      <p:sp>
-        <p:nvSpPr>
-          <p:cNvPr id="13" name="TextBox 12">
-            <a:extLst>
-              <a:ext uri="{FF2B5EF4-FFF2-40B4-BE49-F238E27FC236}">
-                <a16:creationId xmlns:a16="http://schemas.microsoft.com/office/drawing/2014/main" id="{77E39B55-6F7C-4725-8F61-82CA3021F724}"/>
-              </a:ext>
-            </a:extLst>
-          </p:cNvPr>
-          <p:cNvSpPr txBox="1"/>
-          <p:nvPr/>
-        </p:nvSpPr>
-        <p:spPr>
-          <a:xfrm>
-            <a:off x="7798268" y="4052842"/>
-            <a:ext cx="1132514" cy="646331"/>
-          </a:xfrm>
-          <a:prstGeom prst="rect">
-            <a:avLst/>
-          </a:prstGeom>
-          <a:noFill/>
-        </p:spPr>
-        <p:txBody>
-          <a:bodyPr wrap="square" rtlCol="0">
-            <a:spAutoFit/>
-          </a:bodyPr>
-          <a:lstStyle/>
-          <a:p>
-            <a:r>
-              <a:rPr lang="en-GB" sz="1200" dirty="0">
-                <a:solidFill>
-                  <a:schemeClr val="bg1"/>
-                </a:solidFill>
-              </a:rPr>
-              <a:t>Administrator adds/removes a flight</a:t>
-            </a:r>
-          </a:p>
-        </p:txBody>
-      </p:sp>
-      <p:sp>
-        <p:nvSpPr>
-          <p:cNvPr id="14" name="TextBox 13">
-            <a:extLst>
-              <a:ext uri="{FF2B5EF4-FFF2-40B4-BE49-F238E27FC236}">
-                <a16:creationId xmlns:a16="http://schemas.microsoft.com/office/drawing/2014/main" id="{9F9F61B0-F24F-4B0F-ADF1-2217B1D931F3}"/>
-              </a:ext>
-            </a:extLst>
-          </p:cNvPr>
-          <p:cNvSpPr txBox="1"/>
-          <p:nvPr/>
-        </p:nvSpPr>
-        <p:spPr>
-          <a:xfrm>
-            <a:off x="3479334" y="4294443"/>
-            <a:ext cx="914400" cy="646331"/>
-          </a:xfrm>
-          <a:prstGeom prst="rect">
-            <a:avLst/>
-          </a:prstGeom>
-          <a:noFill/>
-        </p:spPr>
-        <p:txBody>
-          <a:bodyPr wrap="square" rtlCol="0">
-            <a:spAutoFit/>
-          </a:bodyPr>
-          <a:lstStyle/>
-          <a:p>
-            <a:r>
-              <a:rPr lang="en-GB" sz="1200" dirty="0">
-                <a:solidFill>
-                  <a:schemeClr val="bg1"/>
-                </a:solidFill>
-              </a:rPr>
-              <a:t>Customer pays for a flight</a:t>
-            </a:r>
-          </a:p>
-        </p:txBody>
-      </p:sp>
-      <p:sp>
-        <p:nvSpPr>
-          <p:cNvPr id="15" name="TextBox 14">
-            <a:extLst>
-              <a:ext uri="{FF2B5EF4-FFF2-40B4-BE49-F238E27FC236}">
-                <a16:creationId xmlns:a16="http://schemas.microsoft.com/office/drawing/2014/main" id="{7AF453B2-F118-4DE9-BFF9-6B9BCD77234D}"/>
-              </a:ext>
-            </a:extLst>
-          </p:cNvPr>
-          <p:cNvSpPr txBox="1"/>
-          <p:nvPr/>
-        </p:nvSpPr>
-        <p:spPr>
-          <a:xfrm>
-            <a:off x="4293768" y="4294442"/>
-            <a:ext cx="914400" cy="646331"/>
-          </a:xfrm>
-          <a:prstGeom prst="rect">
-            <a:avLst/>
-          </a:prstGeom>
-          <a:noFill/>
-        </p:spPr>
-        <p:txBody>
-          <a:bodyPr wrap="square" rtlCol="0">
-            <a:spAutoFit/>
-          </a:bodyPr>
-          <a:lstStyle/>
-          <a:p>
-            <a:r>
-              <a:rPr lang="en-GB" sz="1200" dirty="0">
-                <a:solidFill>
-                  <a:schemeClr val="bg1"/>
-                </a:solidFill>
-              </a:rPr>
-              <a:t>Customer cancels a flight</a:t>
-            </a:r>
-          </a:p>
-        </p:txBody>
-      </p:sp>
-      <p:sp>
-        <p:nvSpPr>
-          <p:cNvPr id="16" name="TextBox 15">
-            <a:extLst>
-              <a:ext uri="{FF2B5EF4-FFF2-40B4-BE49-F238E27FC236}">
-                <a16:creationId xmlns:a16="http://schemas.microsoft.com/office/drawing/2014/main" id="{2897D201-5E2B-4ED2-8B35-DF24BD986E7B}"/>
-              </a:ext>
-            </a:extLst>
-          </p:cNvPr>
-          <p:cNvSpPr txBox="1"/>
-          <p:nvPr/>
-        </p:nvSpPr>
-        <p:spPr>
-          <a:xfrm>
-            <a:off x="5626213" y="3033591"/>
-            <a:ext cx="914400" cy="646331"/>
-          </a:xfrm>
-          <a:prstGeom prst="rect">
-            <a:avLst/>
-          </a:prstGeom>
-          <a:noFill/>
-        </p:spPr>
-        <p:txBody>
-          <a:bodyPr wrap="square" rtlCol="0">
-            <a:spAutoFit/>
-          </a:bodyPr>
-          <a:lstStyle/>
-          <a:p>
-            <a:r>
-              <a:rPr lang="en-GB" sz="1200" dirty="0">
-                <a:solidFill>
-                  <a:schemeClr val="bg1"/>
-                </a:solidFill>
-              </a:rPr>
-              <a:t>Customer creates an account</a:t>
-            </a:r>
-          </a:p>
-        </p:txBody>
-      </p:sp>
-      <p:sp>
-        <p:nvSpPr>
-          <p:cNvPr id="17" name="TextBox 16">
-            <a:extLst>
-              <a:ext uri="{FF2B5EF4-FFF2-40B4-BE49-F238E27FC236}">
-                <a16:creationId xmlns:a16="http://schemas.microsoft.com/office/drawing/2014/main" id="{125E644A-7456-47E0-9464-829972F47F9B}"/>
-              </a:ext>
-            </a:extLst>
-          </p:cNvPr>
-          <p:cNvSpPr txBox="1"/>
-          <p:nvPr/>
-        </p:nvSpPr>
-        <p:spPr>
-          <a:xfrm>
-            <a:off x="9168654" y="4083807"/>
-            <a:ext cx="2023145" cy="461665"/>
-          </a:xfrm>
-          <a:prstGeom prst="rect">
-            <a:avLst/>
-          </a:prstGeom>
-          <a:noFill/>
-        </p:spPr>
-        <p:txBody>
-          <a:bodyPr wrap="square" rtlCol="0">
-            <a:spAutoFit/>
-          </a:bodyPr>
-          <a:lstStyle/>
-          <a:p>
-            <a:r>
-              <a:rPr lang="en-GB" sz="1200" dirty="0">
-                <a:solidFill>
-                  <a:schemeClr val="bg1"/>
-                </a:solidFill>
-              </a:rPr>
-              <a:t>Administrator sends a secure message to a customer</a:t>
-            </a:r>
-          </a:p>
-        </p:txBody>
-      </p:sp>
-      <p:sp>
-        <p:nvSpPr>
-          <p:cNvPr id="18" name="TextBox 17">
-            <a:extLst>
-              <a:ext uri="{FF2B5EF4-FFF2-40B4-BE49-F238E27FC236}">
-                <a16:creationId xmlns:a16="http://schemas.microsoft.com/office/drawing/2014/main" id="{FC1A53E5-A29E-49BE-81C7-2397562AF4EE}"/>
-              </a:ext>
-            </a:extLst>
-          </p:cNvPr>
-          <p:cNvSpPr txBox="1"/>
-          <p:nvPr/>
-        </p:nvSpPr>
-        <p:spPr>
-          <a:xfrm>
-            <a:off x="9168654" y="6064605"/>
-            <a:ext cx="1476462" cy="461665"/>
-          </a:xfrm>
-          <a:prstGeom prst="rect">
-            <a:avLst/>
-          </a:prstGeom>
-          <a:noFill/>
-        </p:spPr>
-        <p:txBody>
-          <a:bodyPr wrap="square" rtlCol="0">
-            <a:spAutoFit/>
-          </a:bodyPr>
-          <a:lstStyle/>
-          <a:p>
-            <a:r>
-              <a:rPr lang="en-GB" sz="1200" dirty="0">
-                <a:solidFill>
-                  <a:schemeClr val="bg1"/>
-                </a:solidFill>
-              </a:rPr>
-              <a:t>Administrator looks at security logs</a:t>
-            </a:r>
-          </a:p>
-        </p:txBody>
-      </p:sp>
-      <p:sp>
-        <p:nvSpPr>
-          <p:cNvPr id="19" name="TextBox 18">
-            <a:extLst>
-              <a:ext uri="{FF2B5EF4-FFF2-40B4-BE49-F238E27FC236}">
-                <a16:creationId xmlns:a16="http://schemas.microsoft.com/office/drawing/2014/main" id="{0FDEF6CF-D8EB-4A86-A91D-45E883DCD6F9}"/>
-              </a:ext>
-            </a:extLst>
-          </p:cNvPr>
-          <p:cNvSpPr txBox="1"/>
-          <p:nvPr/>
-        </p:nvSpPr>
-        <p:spPr>
-          <a:xfrm>
-            <a:off x="6254691" y="5434249"/>
-            <a:ext cx="1273032" cy="461665"/>
-          </a:xfrm>
-          <a:prstGeom prst="rect">
-            <a:avLst/>
-          </a:prstGeom>
-          <a:noFill/>
-        </p:spPr>
-        <p:txBody>
-          <a:bodyPr wrap="square" rtlCol="0">
-            <a:spAutoFit/>
-          </a:bodyPr>
-          <a:lstStyle/>
-          <a:p>
-            <a:r>
-              <a:rPr lang="en-GB" sz="1200" dirty="0">
-                <a:solidFill>
-                  <a:schemeClr val="bg1"/>
-                </a:solidFill>
-              </a:rPr>
-              <a:t>Customer deletes account</a:t>
-            </a:r>
-          </a:p>
-        </p:txBody>
-      </p:sp>
-      <p:sp>
-        <p:nvSpPr>
-          <p:cNvPr id="20" name="TextBox 19">
-            <a:extLst>
-              <a:ext uri="{FF2B5EF4-FFF2-40B4-BE49-F238E27FC236}">
-                <a16:creationId xmlns:a16="http://schemas.microsoft.com/office/drawing/2014/main" id="{66E0164A-6D8E-4A81-8847-9B6F6B925DE6}"/>
-              </a:ext>
-            </a:extLst>
-          </p:cNvPr>
-          <p:cNvSpPr txBox="1"/>
-          <p:nvPr/>
-        </p:nvSpPr>
-        <p:spPr>
-          <a:xfrm>
-            <a:off x="9168654" y="5457189"/>
-            <a:ext cx="1897122" cy="276999"/>
-          </a:xfrm>
-          <a:prstGeom prst="rect">
-            <a:avLst/>
-          </a:prstGeom>
-          <a:noFill/>
-        </p:spPr>
-        <p:txBody>
-          <a:bodyPr wrap="none" rtlCol="0">
-            <a:spAutoFit/>
-          </a:bodyPr>
-          <a:lstStyle/>
-          <a:p>
-            <a:r>
-              <a:rPr lang="en-GB" sz="1200" dirty="0">
-                <a:solidFill>
-                  <a:schemeClr val="bg1"/>
-                </a:solidFill>
-              </a:rPr>
-              <a:t>Administrator looks at stats</a:t>
-            </a:r>
-          </a:p>
-        </p:txBody>
-      </p:sp>
-      <p:sp>
-        <p:nvSpPr>
-          <p:cNvPr id="21" name="TextBox 20">
-            <a:extLst>
-              <a:ext uri="{FF2B5EF4-FFF2-40B4-BE49-F238E27FC236}">
-                <a16:creationId xmlns:a16="http://schemas.microsoft.com/office/drawing/2014/main" id="{FDBF4D74-B481-4183-8084-0F6557F5EAA5}"/>
-              </a:ext>
-            </a:extLst>
-          </p:cNvPr>
-          <p:cNvSpPr txBox="1"/>
-          <p:nvPr/>
-        </p:nvSpPr>
-        <p:spPr>
-          <a:xfrm>
-            <a:off x="1621800" y="3172090"/>
-            <a:ext cx="867610" cy="369332"/>
-          </a:xfrm>
-          <a:prstGeom prst="rect">
-            <a:avLst/>
-          </a:prstGeom>
-          <a:noFill/>
-        </p:spPr>
-        <p:txBody>
-          <a:bodyPr wrap="none" rtlCol="0">
-            <a:spAutoFit/>
-          </a:bodyPr>
-          <a:lstStyle/>
-          <a:p>
-            <a:r>
-              <a:rPr lang="en-GB" dirty="0">
-                <a:solidFill>
-                  <a:schemeClr val="bg1"/>
-                </a:solidFill>
-              </a:rPr>
-              <a:t>Stage 1</a:t>
-            </a:r>
-          </a:p>
-        </p:txBody>
-      </p:sp>
-      <p:sp>
-        <p:nvSpPr>
-          <p:cNvPr id="22" name="TextBox 21">
-            <a:extLst>
-              <a:ext uri="{FF2B5EF4-FFF2-40B4-BE49-F238E27FC236}">
-                <a16:creationId xmlns:a16="http://schemas.microsoft.com/office/drawing/2014/main" id="{942FFCE0-02FB-4F64-B78F-34CD4F8CDAC1}"/>
-              </a:ext>
-            </a:extLst>
-          </p:cNvPr>
-          <p:cNvSpPr txBox="1"/>
-          <p:nvPr/>
-        </p:nvSpPr>
-        <p:spPr>
-          <a:xfrm>
-            <a:off x="1608519" y="4360806"/>
-            <a:ext cx="867610" cy="369332"/>
-          </a:xfrm>
-          <a:prstGeom prst="rect">
-            <a:avLst/>
-          </a:prstGeom>
-          <a:noFill/>
-        </p:spPr>
-        <p:txBody>
-          <a:bodyPr wrap="none" rtlCol="0">
-            <a:spAutoFit/>
-          </a:bodyPr>
-          <a:lstStyle/>
-          <a:p>
-            <a:r>
-              <a:rPr lang="en-GB" dirty="0">
-                <a:solidFill>
-                  <a:schemeClr val="bg1"/>
-                </a:solidFill>
-              </a:rPr>
-              <a:t>Stage 2</a:t>
-            </a:r>
-          </a:p>
-        </p:txBody>
-      </p:sp>
-      <p:sp>
-        <p:nvSpPr>
-          <p:cNvPr id="23" name="TextBox 22">
-            <a:extLst>
-              <a:ext uri="{FF2B5EF4-FFF2-40B4-BE49-F238E27FC236}">
-                <a16:creationId xmlns:a16="http://schemas.microsoft.com/office/drawing/2014/main" id="{E738C715-7B4B-411B-8F75-E2EB17DE4074}"/>
-              </a:ext>
-            </a:extLst>
-          </p:cNvPr>
-          <p:cNvSpPr txBox="1"/>
-          <p:nvPr/>
-        </p:nvSpPr>
-        <p:spPr>
-          <a:xfrm>
-            <a:off x="1583352" y="5364856"/>
-            <a:ext cx="867610" cy="369332"/>
-          </a:xfrm>
-          <a:prstGeom prst="rect">
-            <a:avLst/>
-          </a:prstGeom>
-          <a:noFill/>
-        </p:spPr>
-        <p:txBody>
-          <a:bodyPr wrap="none" rtlCol="0">
-            <a:spAutoFit/>
-          </a:bodyPr>
-          <a:lstStyle/>
-          <a:p>
-            <a:r>
-              <a:rPr lang="en-GB" dirty="0">
-                <a:solidFill>
-                  <a:schemeClr val="bg1"/>
-                </a:solidFill>
-              </a:rPr>
-              <a:t>Stage 3</a:t>
-            </a:r>
-          </a:p>
-        </p:txBody>
-      </p:sp>
-      <p:sp>
-        <p:nvSpPr>
-          <p:cNvPr id="24" name="TextBox 23">
-            <a:extLst>
-              <a:ext uri="{FF2B5EF4-FFF2-40B4-BE49-F238E27FC236}">
-                <a16:creationId xmlns:a16="http://schemas.microsoft.com/office/drawing/2014/main" id="{5B276DD6-6306-480C-928E-BB445C59C8F5}"/>
-              </a:ext>
-            </a:extLst>
-          </p:cNvPr>
-          <p:cNvSpPr txBox="1"/>
-          <p:nvPr/>
-        </p:nvSpPr>
-        <p:spPr>
-          <a:xfrm>
-            <a:off x="1621800" y="6295438"/>
-            <a:ext cx="867610" cy="369332"/>
-          </a:xfrm>
-          <a:prstGeom prst="rect">
-            <a:avLst/>
-          </a:prstGeom>
-          <a:noFill/>
-        </p:spPr>
-        <p:txBody>
-          <a:bodyPr wrap="none" rtlCol="0">
-            <a:spAutoFit/>
-          </a:bodyPr>
-          <a:lstStyle/>
-          <a:p>
-            <a:r>
-              <a:rPr lang="en-GB" dirty="0">
-                <a:solidFill>
-                  <a:schemeClr val="bg1"/>
-                </a:solidFill>
-              </a:rPr>
-              <a:t>Stage 4</a:t>
-            </a:r>
-          </a:p>
-        </p:txBody>
-      </p:sp>
-    </p:spTree>
-    <p:extLst>
-      <p:ext uri="{BB962C8B-B14F-4D97-AF65-F5344CB8AC3E}">
-        <p14:creationId xmlns:p14="http://schemas.microsoft.com/office/powerpoint/2010/main" val="822419268"/>
-      </p:ext>
-    </p:extLst>
-  </p:cSld>
-  <p:clrMapOvr>
-    <a:masterClrMapping/>
-  </p:clrMapOvr>
-</p:sld>
-</file>
-
-<file path=ppt/slides/slide5.xml><?xml version="1.0" encoding="utf-8"?>
-<p:sld xmlns:a="http://schemas.openxmlformats.org/drawingml/2006/main" xmlns:r="http://schemas.openxmlformats.org/officeDocument/2006/relationships" xmlns:p="http://schemas.openxmlformats.org/presentationml/2006/main">
-  <p:cSld>
-    <p:spTree>
-      <p:nvGrpSpPr>
-        <p:cNvPr id="1" name=""/>
-        <p:cNvGrpSpPr/>
-        <p:nvPr/>
-      </p:nvGrpSpPr>
-      <p:grpSpPr>
-        <a:xfrm>
-          <a:off x="0" y="0"/>
-          <a:ext cx="0" cy="0"/>
-          <a:chOff x="0" y="0"/>
-          <a:chExt cx="0" cy="0"/>
-        </a:xfrm>
-      </p:grpSpPr>
-      <p:sp>
-        <p:nvSpPr>
-          <p:cNvPr id="2" name="Title 1">
-            <a:extLst>
-              <a:ext uri="{FF2B5EF4-FFF2-40B4-BE49-F238E27FC236}">
-                <a16:creationId xmlns:a16="http://schemas.microsoft.com/office/drawing/2014/main" id="{EF431E20-CF03-4A3D-9423-7904A2B23333}"/>
-              </a:ext>
-            </a:extLst>
-          </p:cNvPr>
-          <p:cNvSpPr>
-            <a:spLocks noGrp="1"/>
-          </p:cNvSpPr>
-          <p:nvPr>
-            <p:ph type="title"/>
-          </p:nvPr>
-        </p:nvSpPr>
-        <p:spPr/>
-        <p:txBody>
-          <a:bodyPr/>
-          <a:lstStyle/>
-          <a:p>
-            <a:r>
-              <a:rPr lang="en-GB" dirty="0"/>
               <a:t>Risk Assessment – Project Scope</a:t>
             </a:r>
           </a:p>
@@ -7245,7 +6548,7 @@
           <p:nvPr>
             <p:extLst>
               <p:ext uri="{D42A27DB-BD31-4B8C-83A1-F6EECF244321}">
-                <p14:modId xmlns:p14="http://schemas.microsoft.com/office/powerpoint/2010/main" val="2206562656"/>
+                <p14:modId xmlns:p14="http://schemas.microsoft.com/office/powerpoint/2010/main" val="1165678135"/>
               </p:ext>
             </p:extLst>
           </p:nvPr>
@@ -7509,14 +6812,14 @@
                         <a:buNone/>
                       </a:pPr>
                       <a:r>
-                        <a:rPr lang="en-GB" sz="1050">
+                        <a:rPr lang="en-GB" sz="1050" dirty="0">
                           <a:solidFill>
                             <a:schemeClr val="bg1"/>
                           </a:solidFill>
                         </a:rPr>
                         <a:t>Medium-Low</a:t>
                       </a:r>
-                      <a:endParaRPr sz="1050">
+                      <a:endParaRPr sz="1050" dirty="0">
                         <a:solidFill>
                           <a:schemeClr val="bg1"/>
                         </a:solidFill>
@@ -7665,14 +6968,14 @@
                         <a:buNone/>
                       </a:pPr>
                       <a:r>
-                        <a:rPr lang="en-GB" sz="1050">
+                        <a:rPr lang="en-GB" sz="1050" dirty="0">
                           <a:solidFill>
                             <a:schemeClr val="bg1"/>
                           </a:solidFill>
                         </a:rPr>
                         <a:t>Medium-High</a:t>
                       </a:r>
-                      <a:endParaRPr sz="1050">
+                      <a:endParaRPr sz="1050" dirty="0">
                         <a:solidFill>
                           <a:schemeClr val="bg1"/>
                         </a:solidFill>
@@ -7833,14 +7136,14 @@
                         <a:buNone/>
                       </a:pPr>
                       <a:r>
-                        <a:rPr lang="en-GB" sz="1050">
+                        <a:rPr lang="en-GB" sz="1050" dirty="0">
                           <a:solidFill>
                             <a:schemeClr val="bg1"/>
                           </a:solidFill>
                         </a:rPr>
                         <a:t>disagreement on the way forward</a:t>
                       </a:r>
-                      <a:endParaRPr sz="1050">
+                      <a:endParaRPr sz="1050" dirty="0">
                         <a:solidFill>
                           <a:schemeClr val="bg1"/>
                         </a:solidFill>
@@ -7873,14 +7176,14 @@
                         <a:buNone/>
                       </a:pPr>
                       <a:r>
-                        <a:rPr lang="en-GB" sz="1050">
+                        <a:rPr lang="en-GB" sz="1050" dirty="0">
                           <a:solidFill>
                             <a:schemeClr val="bg1"/>
                           </a:solidFill>
                         </a:rPr>
                         <a:t>Medium-Low</a:t>
                       </a:r>
-                      <a:endParaRPr sz="1050">
+                      <a:endParaRPr sz="1050" dirty="0">
                         <a:solidFill>
                           <a:schemeClr val="bg1"/>
                         </a:solidFill>
@@ -8031,14 +7334,14 @@
                         <a:buNone/>
                       </a:pPr>
                       <a:r>
-                        <a:rPr lang="en-GB" sz="1050">
+                        <a:rPr lang="en-GB" sz="1050" dirty="0">
                           <a:solidFill>
                             <a:schemeClr val="bg1"/>
                           </a:solidFill>
                         </a:rPr>
-                        <a:t>Medium-High</a:t>
+                        <a:t>Medium</a:t>
                       </a:r>
-                      <a:endParaRPr sz="1050">
+                      <a:endParaRPr sz="1050" dirty="0">
                         <a:solidFill>
                           <a:schemeClr val="bg1"/>
                         </a:solidFill>
@@ -8047,7 +7350,7 @@
                   </a:txBody>
                   <a:tcPr marL="91450" marR="91450" marT="45725" marB="45725">
                     <a:solidFill>
-                      <a:srgbClr val="E69138"/>
+                      <a:schemeClr val="accent4"/>
                     </a:solidFill>
                   </a:tcPr>
                 </a:tc>
@@ -8224,14 +7527,14 @@
                         <a:buNone/>
                       </a:pPr>
                       <a:r>
-                        <a:rPr lang="en-GB" sz="1050">
+                        <a:rPr lang="en-GB" sz="1050" dirty="0">
                           <a:solidFill>
                             <a:schemeClr val="bg1"/>
                           </a:solidFill>
                         </a:rPr>
-                        <a:t>Low</a:t>
+                        <a:t>Medium-Low</a:t>
                       </a:r>
-                      <a:endParaRPr sz="1050">
+                      <a:endParaRPr sz="1050" dirty="0">
                         <a:solidFill>
                           <a:schemeClr val="bg1"/>
                         </a:solidFill>
@@ -8240,7 +7543,7 @@
                   </a:txBody>
                   <a:tcPr marL="91450" marR="91450" marT="45725" marB="45725">
                     <a:solidFill>
-                      <a:srgbClr val="1155CC"/>
+                      <a:schemeClr val="accent6"/>
                     </a:solidFill>
                   </a:tcPr>
                 </a:tc>
@@ -8382,14 +7685,14 @@
                         <a:buNone/>
                       </a:pPr>
                       <a:r>
-                        <a:rPr lang="en-GB" sz="1050">
+                        <a:rPr lang="en-GB" sz="1050" dirty="0">
                           <a:solidFill>
                             <a:schemeClr val="bg1"/>
                           </a:solidFill>
                         </a:rPr>
                         <a:t>Medium-Low</a:t>
                       </a:r>
-                      <a:endParaRPr sz="1050">
+                      <a:endParaRPr sz="1050" dirty="0">
                         <a:solidFill>
                           <a:schemeClr val="bg1"/>
                         </a:solidFill>
@@ -8540,14 +7843,14 @@
                         <a:buNone/>
                       </a:pPr>
                       <a:r>
-                        <a:rPr lang="en-GB" sz="1050">
+                        <a:rPr lang="en-GB" sz="1050" dirty="0">
                           <a:solidFill>
                             <a:schemeClr val="bg1"/>
                           </a:solidFill>
                         </a:rPr>
                         <a:t>Low</a:t>
                       </a:r>
-                      <a:endParaRPr sz="1050">
+                      <a:endParaRPr sz="1050" dirty="0">
                         <a:solidFill>
                           <a:schemeClr val="bg1"/>
                         </a:solidFill>
@@ -8698,14 +8001,14 @@
                         <a:buNone/>
                       </a:pPr>
                       <a:r>
-                        <a:rPr lang="en-GB" sz="1050">
+                        <a:rPr lang="en-GB" sz="1050" dirty="0">
                           <a:solidFill>
                             <a:schemeClr val="bg1"/>
                           </a:solidFill>
                         </a:rPr>
                         <a:t>Medium</a:t>
                       </a:r>
-                      <a:endParaRPr sz="1050">
+                      <a:endParaRPr sz="1050" dirty="0">
                         <a:solidFill>
                           <a:schemeClr val="bg1"/>
                         </a:solidFill>
@@ -8884,895 +8187,7 @@
 </p:sld>
 </file>
 
-<file path=ppt/slides/slide6.xml><?xml version="1.0" encoding="utf-8"?>
-<p:sld xmlns:a="http://schemas.openxmlformats.org/drawingml/2006/main" xmlns:r="http://schemas.openxmlformats.org/officeDocument/2006/relationships" xmlns:p="http://schemas.openxmlformats.org/presentationml/2006/main">
-  <p:cSld>
-    <p:spTree>
-      <p:nvGrpSpPr>
-        <p:cNvPr id="1" name=""/>
-        <p:cNvGrpSpPr/>
-        <p:nvPr/>
-      </p:nvGrpSpPr>
-      <p:grpSpPr>
-        <a:xfrm>
-          <a:off x="0" y="0"/>
-          <a:ext cx="0" cy="0"/>
-          <a:chOff x="0" y="0"/>
-          <a:chExt cx="0" cy="0"/>
-        </a:xfrm>
-      </p:grpSpPr>
-      <p:sp>
-        <p:nvSpPr>
-          <p:cNvPr id="2" name="Title 1">
-            <a:extLst>
-              <a:ext uri="{FF2B5EF4-FFF2-40B4-BE49-F238E27FC236}">
-                <a16:creationId xmlns:a16="http://schemas.microsoft.com/office/drawing/2014/main" id="{EF431E20-CF03-4A3D-9423-7904A2B23333}"/>
-              </a:ext>
-            </a:extLst>
-          </p:cNvPr>
-          <p:cNvSpPr>
-            <a:spLocks noGrp="1"/>
-          </p:cNvSpPr>
-          <p:nvPr>
-            <p:ph type="title"/>
-          </p:nvPr>
-        </p:nvSpPr>
-        <p:spPr/>
-        <p:txBody>
-          <a:bodyPr/>
-          <a:lstStyle/>
-          <a:p>
-            <a:r>
-              <a:rPr lang="en-GB" dirty="0"/>
-              <a:t>Risk Assessment –Security Issues</a:t>
-            </a:r>
-          </a:p>
-        </p:txBody>
-      </p:sp>
-      <p:graphicFrame>
-        <p:nvGraphicFramePr>
-          <p:cNvPr id="4" name="Google Shape;90;p2">
-            <a:extLst>
-              <a:ext uri="{FF2B5EF4-FFF2-40B4-BE49-F238E27FC236}">
-                <a16:creationId xmlns:a16="http://schemas.microsoft.com/office/drawing/2014/main" id="{4AFDF826-8BF7-49AA-BB0B-71931C4CF7D3}"/>
-              </a:ext>
-            </a:extLst>
-          </p:cNvPr>
-          <p:cNvGraphicFramePr/>
-          <p:nvPr>
-            <p:extLst>
-              <p:ext uri="{D42A27DB-BD31-4B8C-83A1-F6EECF244321}">
-                <p14:modId xmlns:p14="http://schemas.microsoft.com/office/powerpoint/2010/main" val="1246705108"/>
-              </p:ext>
-            </p:extLst>
-          </p:nvPr>
-        </p:nvGraphicFramePr>
-        <p:xfrm>
-          <a:off x="2099112" y="1454977"/>
-          <a:ext cx="8128000" cy="4125020"/>
-        </p:xfrm>
-        <a:graphic>
-          <a:graphicData uri="http://schemas.openxmlformats.org/drawingml/2006/table">
-            <a:tbl>
-              <a:tblPr firstRow="1" bandRow="1">
-                <a:noFill/>
-              </a:tblPr>
-              <a:tblGrid>
-                <a:gridCol w="4064000">
-                  <a:extLst>
-                    <a:ext uri="{9D8B030D-6E8A-4147-A177-3AD203B41FA5}">
-                      <a16:colId xmlns:a16="http://schemas.microsoft.com/office/drawing/2014/main" val="20000"/>
-                    </a:ext>
-                  </a:extLst>
-                </a:gridCol>
-                <a:gridCol w="4064000">
-                  <a:extLst>
-                    <a:ext uri="{9D8B030D-6E8A-4147-A177-3AD203B41FA5}">
-                      <a16:colId xmlns:a16="http://schemas.microsoft.com/office/drawing/2014/main" val="20001"/>
-                    </a:ext>
-                  </a:extLst>
-                </a:gridCol>
-              </a:tblGrid>
-              <a:tr h="370850">
-                <a:tc>
-                  <a:txBody>
-                    <a:bodyPr/>
-                    <a:lstStyle/>
-                    <a:p>
-                      <a:pPr marL="0" marR="0" lvl="0" indent="0" algn="l" rtl="0">
-                        <a:spcBef>
-                          <a:spcPts val="0"/>
-                        </a:spcBef>
-                        <a:spcAft>
-                          <a:spcPts val="0"/>
-                        </a:spcAft>
-                        <a:buNone/>
-                      </a:pPr>
-                      <a:r>
-                        <a:rPr lang="en-GB" sz="1800">
-                          <a:solidFill>
-                            <a:schemeClr val="bg1"/>
-                          </a:solidFill>
-                        </a:rPr>
-                        <a:t>Risk</a:t>
-                      </a:r>
-                      <a:endParaRPr>
-                        <a:solidFill>
-                          <a:schemeClr val="bg1"/>
-                        </a:solidFill>
-                      </a:endParaRPr>
-                    </a:p>
-                  </a:txBody>
-                  <a:tcPr marL="91450" marR="91450" marT="45725" marB="45725">
-                    <a:solidFill>
-                      <a:schemeClr val="accent1">
-                        <a:lumMod val="50000"/>
-                      </a:schemeClr>
-                    </a:solidFill>
-                  </a:tcPr>
-                </a:tc>
-                <a:tc>
-                  <a:txBody>
-                    <a:bodyPr/>
-                    <a:lstStyle/>
-                    <a:p>
-                      <a:pPr marL="0" marR="0" lvl="0" indent="0" algn="l" rtl="0">
-                        <a:spcBef>
-                          <a:spcPts val="0"/>
-                        </a:spcBef>
-                        <a:spcAft>
-                          <a:spcPts val="0"/>
-                        </a:spcAft>
-                        <a:buNone/>
-                      </a:pPr>
-                      <a:r>
-                        <a:rPr lang="en-GB" sz="1800" dirty="0">
-                          <a:solidFill>
-                            <a:schemeClr val="bg1"/>
-                          </a:solidFill>
-                        </a:rPr>
-                        <a:t>Mitigation</a:t>
-                      </a:r>
-                      <a:endParaRPr dirty="0">
-                        <a:solidFill>
-                          <a:schemeClr val="bg1"/>
-                        </a:solidFill>
-                      </a:endParaRPr>
-                    </a:p>
-                  </a:txBody>
-                  <a:tcPr marL="91450" marR="91450" marT="45725" marB="45725">
-                    <a:solidFill>
-                      <a:schemeClr val="accent1">
-                        <a:lumMod val="50000"/>
-                      </a:schemeClr>
-                    </a:solidFill>
-                  </a:tcPr>
-                </a:tc>
-                <a:extLst>
-                  <a:ext uri="{0D108BD9-81ED-4DB2-BD59-A6C34878D82A}">
-                    <a16:rowId xmlns:a16="http://schemas.microsoft.com/office/drawing/2014/main" val="10000"/>
-                  </a:ext>
-                </a:extLst>
-              </a:tr>
-              <a:tr h="370850">
-                <a:tc>
-                  <a:txBody>
-                    <a:bodyPr/>
-                    <a:lstStyle/>
-                    <a:p>
-                      <a:pPr marL="0" marR="0" lvl="0" indent="0" algn="l" rtl="0">
-                        <a:lnSpc>
-                          <a:spcPct val="100000"/>
-                        </a:lnSpc>
-                        <a:spcBef>
-                          <a:spcPts val="0"/>
-                        </a:spcBef>
-                        <a:spcAft>
-                          <a:spcPts val="0"/>
-                        </a:spcAft>
-                        <a:buClr>
-                          <a:schemeClr val="dk1"/>
-                        </a:buClr>
-                        <a:buSzPts val="1800"/>
-                        <a:buFont typeface="Calibri"/>
-                        <a:buNone/>
-                      </a:pPr>
-                      <a:r>
-                        <a:rPr lang="en-GB" sz="1800">
-                          <a:solidFill>
-                            <a:schemeClr val="bg1"/>
-                          </a:solidFill>
-                        </a:rPr>
-                        <a:t>Login security/validation - credential stealing, replay attacks</a:t>
-                      </a:r>
-                      <a:endParaRPr>
-                        <a:solidFill>
-                          <a:schemeClr val="bg1"/>
-                        </a:solidFill>
-                      </a:endParaRPr>
-                    </a:p>
-                    <a:p>
-                      <a:pPr marL="0" marR="0" lvl="0" indent="0" algn="l" rtl="0">
-                        <a:lnSpc>
-                          <a:spcPct val="100000"/>
-                        </a:lnSpc>
-                        <a:spcBef>
-                          <a:spcPts val="0"/>
-                        </a:spcBef>
-                        <a:spcAft>
-                          <a:spcPts val="0"/>
-                        </a:spcAft>
-                        <a:buClr>
-                          <a:schemeClr val="dk1"/>
-                        </a:buClr>
-                        <a:buSzPts val="1800"/>
-                        <a:buFont typeface="Calibri"/>
-                        <a:buNone/>
-                      </a:pPr>
-                      <a:endParaRPr sz="1800">
-                        <a:solidFill>
-                          <a:schemeClr val="bg1"/>
-                        </a:solidFill>
-                      </a:endParaRPr>
-                    </a:p>
-                    <a:p>
-                      <a:pPr marL="0" marR="0" lvl="0" indent="0" algn="l" rtl="0">
-                        <a:spcBef>
-                          <a:spcPts val="0"/>
-                        </a:spcBef>
-                        <a:spcAft>
-                          <a:spcPts val="0"/>
-                        </a:spcAft>
-                        <a:buNone/>
-                      </a:pPr>
-                      <a:endParaRPr sz="1800">
-                        <a:solidFill>
-                          <a:schemeClr val="bg1"/>
-                        </a:solidFill>
-                      </a:endParaRPr>
-                    </a:p>
-                  </a:txBody>
-                  <a:tcPr marL="91450" marR="91450" marT="45725" marB="45725">
-                    <a:solidFill>
-                      <a:schemeClr val="accent5">
-                        <a:lumMod val="75000"/>
-                      </a:schemeClr>
-                    </a:solidFill>
-                  </a:tcPr>
-                </a:tc>
-                <a:tc>
-                  <a:txBody>
-                    <a:bodyPr/>
-                    <a:lstStyle/>
-                    <a:p>
-                      <a:pPr marL="0" marR="0" lvl="0" indent="0" algn="l" rtl="0">
-                        <a:spcBef>
-                          <a:spcPts val="0"/>
-                        </a:spcBef>
-                        <a:spcAft>
-                          <a:spcPts val="0"/>
-                        </a:spcAft>
-                        <a:buNone/>
-                      </a:pPr>
-                      <a:r>
-                        <a:rPr lang="en-GB" sz="1800" dirty="0">
-                          <a:solidFill>
-                            <a:schemeClr val="bg1"/>
-                          </a:solidFill>
-                        </a:rPr>
-                        <a:t>encrypting passwords with salt,, limited user accounts on database for customer users, password policy, minimum length</a:t>
-                      </a:r>
-                      <a:endParaRPr dirty="0">
-                        <a:solidFill>
-                          <a:schemeClr val="bg1"/>
-                        </a:solidFill>
-                      </a:endParaRPr>
-                    </a:p>
-                  </a:txBody>
-                  <a:tcPr marL="91450" marR="91450" marT="45725" marB="45725">
-                    <a:solidFill>
-                      <a:schemeClr val="accent5">
-                        <a:lumMod val="75000"/>
-                      </a:schemeClr>
-                    </a:solidFill>
-                  </a:tcPr>
-                </a:tc>
-                <a:extLst>
-                  <a:ext uri="{0D108BD9-81ED-4DB2-BD59-A6C34878D82A}">
-                    <a16:rowId xmlns:a16="http://schemas.microsoft.com/office/drawing/2014/main" val="10001"/>
-                  </a:ext>
-                </a:extLst>
-              </a:tr>
-              <a:tr h="370850">
-                <a:tc>
-                  <a:txBody>
-                    <a:bodyPr/>
-                    <a:lstStyle/>
-                    <a:p>
-                      <a:pPr marL="0" marR="0" lvl="0" indent="0" algn="l" rtl="0">
-                        <a:spcBef>
-                          <a:spcPts val="0"/>
-                        </a:spcBef>
-                        <a:spcAft>
-                          <a:spcPts val="0"/>
-                        </a:spcAft>
-                        <a:buNone/>
-                      </a:pPr>
-                      <a:r>
-                        <a:rPr lang="en-GB" sz="1800" dirty="0">
-                          <a:solidFill>
-                            <a:schemeClr val="bg1"/>
-                          </a:solidFill>
-                        </a:rPr>
-                        <a:t>insecure input - SQL injection</a:t>
-                      </a:r>
-                      <a:endParaRPr dirty="0">
-                        <a:solidFill>
-                          <a:schemeClr val="bg1"/>
-                        </a:solidFill>
-                      </a:endParaRPr>
-                    </a:p>
-                  </a:txBody>
-                  <a:tcPr marL="91450" marR="91450" marT="45725" marB="45725">
-                    <a:solidFill>
-                      <a:schemeClr val="accent1">
-                        <a:lumMod val="75000"/>
-                      </a:schemeClr>
-                    </a:solidFill>
-                  </a:tcPr>
-                </a:tc>
-                <a:tc>
-                  <a:txBody>
-                    <a:bodyPr/>
-                    <a:lstStyle/>
-                    <a:p>
-                      <a:pPr marL="0" marR="0" lvl="0" indent="0" algn="l" rtl="0">
-                        <a:spcBef>
-                          <a:spcPts val="0"/>
-                        </a:spcBef>
-                        <a:spcAft>
-                          <a:spcPts val="0"/>
-                        </a:spcAft>
-                        <a:buNone/>
-                      </a:pPr>
-                      <a:r>
-                        <a:rPr lang="en-GB" sz="1800" dirty="0">
-                          <a:solidFill>
-                            <a:schemeClr val="bg1"/>
-                          </a:solidFill>
-                        </a:rPr>
-                        <a:t>use binding parameters in SQL procedures, sanitize input</a:t>
-                      </a:r>
-                      <a:endParaRPr dirty="0">
-                        <a:solidFill>
-                          <a:schemeClr val="bg1"/>
-                        </a:solidFill>
-                      </a:endParaRPr>
-                    </a:p>
-                  </a:txBody>
-                  <a:tcPr marL="91450" marR="91450" marT="45725" marB="45725">
-                    <a:solidFill>
-                      <a:schemeClr val="accent1">
-                        <a:lumMod val="75000"/>
-                      </a:schemeClr>
-                    </a:solidFill>
-                  </a:tcPr>
-                </a:tc>
-                <a:extLst>
-                  <a:ext uri="{0D108BD9-81ED-4DB2-BD59-A6C34878D82A}">
-                    <a16:rowId xmlns:a16="http://schemas.microsoft.com/office/drawing/2014/main" val="10002"/>
-                  </a:ext>
-                </a:extLst>
-              </a:tr>
-              <a:tr h="370850">
-                <a:tc>
-                  <a:txBody>
-                    <a:bodyPr/>
-                    <a:lstStyle/>
-                    <a:p>
-                      <a:pPr marL="0" marR="0" lvl="0" indent="0" algn="l" rtl="0">
-                        <a:lnSpc>
-                          <a:spcPct val="100000"/>
-                        </a:lnSpc>
-                        <a:spcBef>
-                          <a:spcPts val="0"/>
-                        </a:spcBef>
-                        <a:spcAft>
-                          <a:spcPts val="0"/>
-                        </a:spcAft>
-                        <a:buClr>
-                          <a:schemeClr val="dk1"/>
-                        </a:buClr>
-                        <a:buSzPts val="1800"/>
-                        <a:buFont typeface="Calibri"/>
-                        <a:buNone/>
-                      </a:pPr>
-                      <a:r>
-                        <a:rPr lang="en-GB" sz="1800">
-                          <a:solidFill>
-                            <a:schemeClr val="bg1"/>
-                          </a:solidFill>
-                        </a:rPr>
-                        <a:t>denial of service attacks</a:t>
-                      </a:r>
-                      <a:endParaRPr>
-                        <a:solidFill>
-                          <a:schemeClr val="bg1"/>
-                        </a:solidFill>
-                      </a:endParaRPr>
-                    </a:p>
-                  </a:txBody>
-                  <a:tcPr marL="91450" marR="91450" marT="45725" marB="45725">
-                    <a:solidFill>
-                      <a:schemeClr val="accent5">
-                        <a:lumMod val="75000"/>
-                      </a:schemeClr>
-                    </a:solidFill>
-                  </a:tcPr>
-                </a:tc>
-                <a:tc>
-                  <a:txBody>
-                    <a:bodyPr/>
-                    <a:lstStyle/>
-                    <a:p>
-                      <a:pPr marL="0" marR="0" lvl="0" indent="0" algn="l" rtl="0">
-                        <a:spcBef>
-                          <a:spcPts val="0"/>
-                        </a:spcBef>
-                        <a:spcAft>
-                          <a:spcPts val="0"/>
-                        </a:spcAft>
-                        <a:buNone/>
-                      </a:pPr>
-                      <a:r>
-                        <a:rPr lang="en-GB" sz="1800" dirty="0">
-                          <a:solidFill>
-                            <a:schemeClr val="bg1"/>
-                          </a:solidFill>
-                        </a:rPr>
-                        <a:t>limit number of failed login attempts, restrict time between ping requests</a:t>
-                      </a:r>
-                      <a:endParaRPr dirty="0">
-                        <a:solidFill>
-                          <a:schemeClr val="bg1"/>
-                        </a:solidFill>
-                      </a:endParaRPr>
-                    </a:p>
-                  </a:txBody>
-                  <a:tcPr marL="91450" marR="91450" marT="45725" marB="45725">
-                    <a:solidFill>
-                      <a:schemeClr val="accent5">
-                        <a:lumMod val="75000"/>
-                      </a:schemeClr>
-                    </a:solidFill>
-                  </a:tcPr>
-                </a:tc>
-                <a:extLst>
-                  <a:ext uri="{0D108BD9-81ED-4DB2-BD59-A6C34878D82A}">
-                    <a16:rowId xmlns:a16="http://schemas.microsoft.com/office/drawing/2014/main" val="10003"/>
-                  </a:ext>
-                </a:extLst>
-              </a:tr>
-              <a:tr h="370850">
-                <a:tc>
-                  <a:txBody>
-                    <a:bodyPr/>
-                    <a:lstStyle/>
-                    <a:p>
-                      <a:pPr marL="0" marR="0" lvl="0" indent="0" algn="l" rtl="0">
-                        <a:spcBef>
-                          <a:spcPts val="0"/>
-                        </a:spcBef>
-                        <a:spcAft>
-                          <a:spcPts val="0"/>
-                        </a:spcAft>
-                        <a:buNone/>
-                      </a:pPr>
-                      <a:r>
-                        <a:rPr lang="en-GB" sz="1800">
-                          <a:solidFill>
-                            <a:schemeClr val="bg1"/>
-                          </a:solidFill>
-                        </a:rPr>
-                        <a:t>brute force attacks</a:t>
-                      </a:r>
-                      <a:endParaRPr>
-                        <a:solidFill>
-                          <a:schemeClr val="bg1"/>
-                        </a:solidFill>
-                      </a:endParaRPr>
-                    </a:p>
-                  </a:txBody>
-                  <a:tcPr marL="91450" marR="91450" marT="45725" marB="45725">
-                    <a:solidFill>
-                      <a:schemeClr val="accent1">
-                        <a:lumMod val="75000"/>
-                      </a:schemeClr>
-                    </a:solidFill>
-                  </a:tcPr>
-                </a:tc>
-                <a:tc>
-                  <a:txBody>
-                    <a:bodyPr/>
-                    <a:lstStyle/>
-                    <a:p>
-                      <a:pPr marL="0" marR="0" lvl="0" indent="0" algn="l" rtl="0">
-                        <a:spcBef>
-                          <a:spcPts val="0"/>
-                        </a:spcBef>
-                        <a:spcAft>
-                          <a:spcPts val="0"/>
-                        </a:spcAft>
-                        <a:buNone/>
-                      </a:pPr>
-                      <a:r>
-                        <a:rPr lang="en-GB" sz="1800" dirty="0">
-                          <a:solidFill>
-                            <a:schemeClr val="bg1"/>
-                          </a:solidFill>
-                        </a:rPr>
-                        <a:t>limit number of failed login attempts</a:t>
-                      </a:r>
-                      <a:endParaRPr dirty="0">
-                        <a:solidFill>
-                          <a:schemeClr val="bg1"/>
-                        </a:solidFill>
-                      </a:endParaRPr>
-                    </a:p>
-                  </a:txBody>
-                  <a:tcPr marL="91450" marR="91450" marT="45725" marB="45725">
-                    <a:solidFill>
-                      <a:schemeClr val="accent1">
-                        <a:lumMod val="75000"/>
-                      </a:schemeClr>
-                    </a:solidFill>
-                  </a:tcPr>
-                </a:tc>
-                <a:extLst>
-                  <a:ext uri="{0D108BD9-81ED-4DB2-BD59-A6C34878D82A}">
-                    <a16:rowId xmlns:a16="http://schemas.microsoft.com/office/drawing/2014/main" val="10004"/>
-                  </a:ext>
-                </a:extLst>
-              </a:tr>
-              <a:tr h="302420">
-                <a:tc>
-                  <a:txBody>
-                    <a:bodyPr/>
-                    <a:lstStyle/>
-                    <a:p>
-                      <a:pPr marL="0" marR="0" lvl="0" indent="0" algn="l" rtl="0">
-                        <a:spcBef>
-                          <a:spcPts val="0"/>
-                        </a:spcBef>
-                        <a:spcAft>
-                          <a:spcPts val="0"/>
-                        </a:spcAft>
-                        <a:buNone/>
-                      </a:pPr>
-                      <a:r>
-                        <a:rPr lang="en-GB" sz="1800">
-                          <a:solidFill>
-                            <a:schemeClr val="bg1"/>
-                          </a:solidFill>
-                        </a:rPr>
-                        <a:t>man in the middle attack</a:t>
-                      </a:r>
-                      <a:endParaRPr>
-                        <a:solidFill>
-                          <a:schemeClr val="bg1"/>
-                        </a:solidFill>
-                      </a:endParaRPr>
-                    </a:p>
-                  </a:txBody>
-                  <a:tcPr marL="91450" marR="91450" marT="45725" marB="45725">
-                    <a:solidFill>
-                      <a:schemeClr val="accent5">
-                        <a:lumMod val="75000"/>
-                      </a:schemeClr>
-                    </a:solidFill>
-                  </a:tcPr>
-                </a:tc>
-                <a:tc>
-                  <a:txBody>
-                    <a:bodyPr/>
-                    <a:lstStyle/>
-                    <a:p>
-                      <a:pPr marL="0" marR="0" lvl="0" indent="0" algn="l" rtl="0">
-                        <a:spcBef>
-                          <a:spcPts val="0"/>
-                        </a:spcBef>
-                        <a:spcAft>
-                          <a:spcPts val="0"/>
-                        </a:spcAft>
-                        <a:buNone/>
-                      </a:pPr>
-                      <a:r>
-                        <a:rPr lang="en-GB" sz="1800" dirty="0">
-                          <a:solidFill>
-                            <a:schemeClr val="bg1"/>
-                          </a:solidFill>
-                        </a:rPr>
-                        <a:t>token authentication - PHP session variable or token, use of HTTPS if available</a:t>
-                      </a:r>
-                      <a:endParaRPr dirty="0">
-                        <a:solidFill>
-                          <a:schemeClr val="bg1"/>
-                        </a:solidFill>
-                      </a:endParaRPr>
-                    </a:p>
-                  </a:txBody>
-                  <a:tcPr marL="91450" marR="91450" marT="45725" marB="45725">
-                    <a:solidFill>
-                      <a:schemeClr val="accent5">
-                        <a:lumMod val="75000"/>
-                      </a:schemeClr>
-                    </a:solidFill>
-                  </a:tcPr>
-                </a:tc>
-                <a:extLst>
-                  <a:ext uri="{0D108BD9-81ED-4DB2-BD59-A6C34878D82A}">
-                    <a16:rowId xmlns:a16="http://schemas.microsoft.com/office/drawing/2014/main" val="10005"/>
-                  </a:ext>
-                </a:extLst>
-              </a:tr>
-            </a:tbl>
-          </a:graphicData>
-        </a:graphic>
-      </p:graphicFrame>
-    </p:spTree>
-    <p:extLst>
-      <p:ext uri="{BB962C8B-B14F-4D97-AF65-F5344CB8AC3E}">
-        <p14:creationId xmlns:p14="http://schemas.microsoft.com/office/powerpoint/2010/main" val="3161342937"/>
-      </p:ext>
-    </p:extLst>
-  </p:cSld>
-  <p:clrMapOvr>
-    <a:masterClrMapping/>
-  </p:clrMapOvr>
-</p:sld>
-</file>
-
-<file path=ppt/slides/slide7.xml><?xml version="1.0" encoding="utf-8"?>
-<p:sld xmlns:a="http://schemas.openxmlformats.org/drawingml/2006/main" xmlns:r="http://schemas.openxmlformats.org/officeDocument/2006/relationships" xmlns:p="http://schemas.openxmlformats.org/presentationml/2006/main">
-  <p:cSld>
-    <p:spTree>
-      <p:nvGrpSpPr>
-        <p:cNvPr id="1" name=""/>
-        <p:cNvGrpSpPr/>
-        <p:nvPr/>
-      </p:nvGrpSpPr>
-      <p:grpSpPr>
-        <a:xfrm>
-          <a:off x="0" y="0"/>
-          <a:ext cx="0" cy="0"/>
-          <a:chOff x="0" y="0"/>
-          <a:chExt cx="0" cy="0"/>
-        </a:xfrm>
-      </p:grpSpPr>
-      <p:sp>
-        <p:nvSpPr>
-          <p:cNvPr id="2" name="Title 1">
-            <a:extLst>
-              <a:ext uri="{FF2B5EF4-FFF2-40B4-BE49-F238E27FC236}">
-                <a16:creationId xmlns:a16="http://schemas.microsoft.com/office/drawing/2014/main" id="{E186EE41-6B74-40A0-AE7B-E0882D433652}"/>
-              </a:ext>
-            </a:extLst>
-          </p:cNvPr>
-          <p:cNvSpPr>
-            <a:spLocks noGrp="1"/>
-          </p:cNvSpPr>
-          <p:nvPr>
-            <p:ph type="title"/>
-          </p:nvPr>
-        </p:nvSpPr>
-        <p:spPr/>
-        <p:txBody>
-          <a:bodyPr/>
-          <a:lstStyle/>
-          <a:p>
-            <a:r>
-              <a:rPr lang="en-GB" dirty="0"/>
-              <a:t>Computer Science Elements</a:t>
-            </a:r>
-          </a:p>
-        </p:txBody>
-      </p:sp>
-      <p:sp>
-        <p:nvSpPr>
-          <p:cNvPr id="3" name="Content Placeholder 2">
-            <a:extLst>
-              <a:ext uri="{FF2B5EF4-FFF2-40B4-BE49-F238E27FC236}">
-                <a16:creationId xmlns:a16="http://schemas.microsoft.com/office/drawing/2014/main" id="{1F1A997C-0D9F-49B9-AF88-6760B082751F}"/>
-              </a:ext>
-            </a:extLst>
-          </p:cNvPr>
-          <p:cNvSpPr>
-            <a:spLocks noGrp="1"/>
-          </p:cNvSpPr>
-          <p:nvPr>
-            <p:ph idx="1"/>
-          </p:nvPr>
-        </p:nvSpPr>
-        <p:spPr/>
-        <p:txBody>
-          <a:bodyPr/>
-          <a:lstStyle/>
-          <a:p>
-            <a:r>
-              <a:rPr lang="en-GB" dirty="0"/>
-              <a:t>Predict number of flights for a day based on previous data</a:t>
-            </a:r>
-          </a:p>
-          <a:p>
-            <a:r>
-              <a:rPr lang="en-GB" dirty="0"/>
-              <a:t>Determine how much a flight can be overbooked based on cancellations</a:t>
-            </a:r>
-          </a:p>
-          <a:p>
-            <a:r>
-              <a:rPr lang="en-GB" dirty="0"/>
-              <a:t>Determine optimal price for flights based on previous data</a:t>
-            </a:r>
-          </a:p>
-          <a:p>
-            <a:r>
-              <a:rPr lang="en-GB" dirty="0"/>
-              <a:t>Figure out a packing algorithm for 3d space</a:t>
-            </a:r>
-          </a:p>
-        </p:txBody>
-      </p:sp>
-    </p:spTree>
-    <p:extLst>
-      <p:ext uri="{BB962C8B-B14F-4D97-AF65-F5344CB8AC3E}">
-        <p14:creationId xmlns:p14="http://schemas.microsoft.com/office/powerpoint/2010/main" val="3783491452"/>
-      </p:ext>
-    </p:extLst>
-  </p:cSld>
-  <p:clrMapOvr>
-    <a:masterClrMapping/>
-  </p:clrMapOvr>
-</p:sld>
-</file>
-
 <file path=ppt/slides/slide8.xml><?xml version="1.0" encoding="utf-8"?>
-<p:sld xmlns:a="http://schemas.openxmlformats.org/drawingml/2006/main" xmlns:r="http://schemas.openxmlformats.org/officeDocument/2006/relationships" xmlns:p="http://schemas.openxmlformats.org/presentationml/2006/main">
-  <p:cSld>
-    <p:spTree>
-      <p:nvGrpSpPr>
-        <p:cNvPr id="1" name=""/>
-        <p:cNvGrpSpPr/>
-        <p:nvPr/>
-      </p:nvGrpSpPr>
-      <p:grpSpPr>
-        <a:xfrm>
-          <a:off x="0" y="0"/>
-          <a:ext cx="0" cy="0"/>
-          <a:chOff x="0" y="0"/>
-          <a:chExt cx="0" cy="0"/>
-        </a:xfrm>
-      </p:grpSpPr>
-      <p:sp>
-        <p:nvSpPr>
-          <p:cNvPr id="2" name="Title 1">
-            <a:extLst>
-              <a:ext uri="{FF2B5EF4-FFF2-40B4-BE49-F238E27FC236}">
-                <a16:creationId xmlns:a16="http://schemas.microsoft.com/office/drawing/2014/main" id="{3DC76213-A104-49ED-994D-E168FADD581A}"/>
-              </a:ext>
-            </a:extLst>
-          </p:cNvPr>
-          <p:cNvSpPr>
-            <a:spLocks noGrp="1"/>
-          </p:cNvSpPr>
-          <p:nvPr>
-            <p:ph type="title"/>
-          </p:nvPr>
-        </p:nvSpPr>
-        <p:spPr/>
-        <p:txBody>
-          <a:bodyPr/>
-          <a:lstStyle/>
-          <a:p>
-            <a:r>
-              <a:rPr lang="en-GB" dirty="0"/>
-              <a:t>Security Elements</a:t>
-            </a:r>
-          </a:p>
-        </p:txBody>
-      </p:sp>
-      <p:sp>
-        <p:nvSpPr>
-          <p:cNvPr id="3" name="Content Placeholder 2">
-            <a:extLst>
-              <a:ext uri="{FF2B5EF4-FFF2-40B4-BE49-F238E27FC236}">
-                <a16:creationId xmlns:a16="http://schemas.microsoft.com/office/drawing/2014/main" id="{4C7E304C-1BBE-482F-832B-D711CA31C8FF}"/>
-              </a:ext>
-            </a:extLst>
-          </p:cNvPr>
-          <p:cNvSpPr>
-            <a:spLocks noGrp="1"/>
-          </p:cNvSpPr>
-          <p:nvPr>
-            <p:ph idx="1"/>
-          </p:nvPr>
-        </p:nvSpPr>
-        <p:spPr/>
-        <p:txBody>
-          <a:bodyPr>
-            <a:normAutofit fontScale="92500" lnSpcReduction="10000"/>
-          </a:bodyPr>
-          <a:lstStyle/>
-          <a:p>
-            <a:r>
-              <a:rPr lang="en-GB" dirty="0"/>
-              <a:t>encrypting passwords with salt</a:t>
-            </a:r>
-          </a:p>
-          <a:p>
-            <a:r>
-              <a:rPr lang="en-GB" dirty="0"/>
-              <a:t>limit number of failed login attempts</a:t>
-            </a:r>
-          </a:p>
-          <a:p>
-            <a:r>
-              <a:rPr lang="en-GB" dirty="0"/>
-              <a:t>limit number of failed login attempts</a:t>
-            </a:r>
-          </a:p>
-          <a:p>
-            <a:r>
-              <a:rPr lang="en-GB" dirty="0"/>
-              <a:t>token authentication - PHP session variable using a random number?</a:t>
-            </a:r>
-          </a:p>
-          <a:p>
-            <a:r>
-              <a:rPr lang="en-GB" dirty="0"/>
-              <a:t>use of HTTPS if available</a:t>
-            </a:r>
-          </a:p>
-          <a:p>
-            <a:r>
-              <a:rPr lang="en-GB" dirty="0"/>
-              <a:t>limited user accounts on database for customer users</a:t>
-            </a:r>
-          </a:p>
-          <a:p>
-            <a:r>
-              <a:rPr lang="en-GB" dirty="0"/>
-              <a:t>sanitize input</a:t>
-            </a:r>
-          </a:p>
-          <a:p>
-            <a:r>
-              <a:rPr lang="en-GB" dirty="0"/>
-              <a:t>password policy, minimum length</a:t>
-            </a:r>
-          </a:p>
-          <a:p>
-            <a:r>
-              <a:rPr lang="en-GB" dirty="0"/>
-              <a:t>implement an encryption algorithm to send secure messages to customers/admin stored on database</a:t>
-            </a:r>
-          </a:p>
-        </p:txBody>
-      </p:sp>
-    </p:spTree>
-    <p:extLst>
-      <p:ext uri="{BB962C8B-B14F-4D97-AF65-F5344CB8AC3E}">
-        <p14:creationId xmlns:p14="http://schemas.microsoft.com/office/powerpoint/2010/main" val="929155232"/>
-      </p:ext>
-    </p:extLst>
-  </p:cSld>
-  <p:clrMapOvr>
-    <a:masterClrMapping/>
-  </p:clrMapOvr>
-</p:sld>
-</file>
-
-<file path=ppt/slides/slide9.xml><?xml version="1.0" encoding="utf-8"?>
 <p:sld xmlns:a="http://schemas.openxmlformats.org/drawingml/2006/main" xmlns:r="http://schemas.openxmlformats.org/officeDocument/2006/relationships" xmlns:p="http://schemas.openxmlformats.org/presentationml/2006/main">
   <p:cSld>
     <p:spTree>
@@ -10443,4 +8858,47 @@
     </a:ext>
   </a:extLst>
 </a:theme>
+</file>
+
+<file path=ppt/theme/themeOverride1.xml><?xml version="1.0" encoding="utf-8"?>
+<a:themeOverride xmlns:a="http://schemas.openxmlformats.org/drawingml/2006/main">
+  <a:clrScheme name="Office">
+    <a:dk1>
+      <a:sysClr val="windowText" lastClr="000000"/>
+    </a:dk1>
+    <a:lt1>
+      <a:sysClr val="window" lastClr="FFFFFF"/>
+    </a:lt1>
+    <a:dk2>
+      <a:srgbClr val="44546A"/>
+    </a:dk2>
+    <a:lt2>
+      <a:srgbClr val="E7E6E6"/>
+    </a:lt2>
+    <a:accent1>
+      <a:srgbClr val="4472C4"/>
+    </a:accent1>
+    <a:accent2>
+      <a:srgbClr val="ED7D31"/>
+    </a:accent2>
+    <a:accent3>
+      <a:srgbClr val="A5A5A5"/>
+    </a:accent3>
+    <a:accent4>
+      <a:srgbClr val="FFC000"/>
+    </a:accent4>
+    <a:accent5>
+      <a:srgbClr val="5B9BD5"/>
+    </a:accent5>
+    <a:accent6>
+      <a:srgbClr val="70AD47"/>
+    </a:accent6>
+    <a:hlink>
+      <a:srgbClr val="0563C1"/>
+    </a:hlink>
+    <a:folHlink>
+      <a:srgbClr val="954F72"/>
+    </a:folHlink>
+  </a:clrScheme>
+</a:themeOverride>
 </file>
</xml_diff>

<commit_message>
added a critique page to presentation
</commit_message>
<xml_diff>
--- a/Documents/Presentations/PRCO204 Group Presentation 2.pptx
+++ b/Documents/Presentations/PRCO204 Group Presentation 2.pptx
@@ -5,7 +5,7 @@
     <p:sldMasterId id="2147483648" r:id="rId1"/>
   </p:sldMasterIdLst>
   <p:notesMasterIdLst>
-    <p:notesMasterId r:id="rId22"/>
+    <p:notesMasterId r:id="rId23"/>
   </p:notesMasterIdLst>
   <p:sldIdLst>
     <p:sldId id="256" r:id="rId2"/>
@@ -26,8 +26,9 @@
     <p:sldId id="281" r:id="rId17"/>
     <p:sldId id="282" r:id="rId18"/>
     <p:sldId id="284" r:id="rId19"/>
-    <p:sldId id="267" r:id="rId20"/>
-    <p:sldId id="263" r:id="rId21"/>
+    <p:sldId id="285" r:id="rId20"/>
+    <p:sldId id="267" r:id="rId21"/>
+    <p:sldId id="263" r:id="rId22"/>
   </p:sldIdLst>
   <p:sldSz cx="12192000" cy="6858000"/>
   <p:notesSz cx="6858000" cy="9144000"/>
@@ -4952,6 +4953,250 @@
 </file>
 
 <file path=ppt/slides/slide19.xml><?xml version="1.0" encoding="utf-8"?>
+<p:sld xmlns:a="http://schemas.openxmlformats.org/drawingml/2006/main" xmlns:r="http://schemas.openxmlformats.org/officeDocument/2006/relationships" xmlns:p="http://schemas.openxmlformats.org/presentationml/2006/main">
+  <p:cSld>
+    <p:spTree>
+      <p:nvGrpSpPr>
+        <p:cNvPr id="1" name=""/>
+        <p:cNvGrpSpPr/>
+        <p:nvPr/>
+      </p:nvGrpSpPr>
+      <p:grpSpPr>
+        <a:xfrm>
+          <a:off x="0" y="0"/>
+          <a:ext cx="0" cy="0"/>
+          <a:chOff x="0" y="0"/>
+          <a:chExt cx="0" cy="0"/>
+        </a:xfrm>
+      </p:grpSpPr>
+      <p:sp>
+        <p:nvSpPr>
+          <p:cNvPr id="2" name="Title 1">
+            <a:extLst>
+              <a:ext uri="{FF2B5EF4-FFF2-40B4-BE49-F238E27FC236}">
+                <a16:creationId xmlns:a16="http://schemas.microsoft.com/office/drawing/2014/main" id="{5399851E-FD90-427A-B00D-729037E009C0}"/>
+              </a:ext>
+            </a:extLst>
+          </p:cNvPr>
+          <p:cNvSpPr>
+            <a:spLocks noGrp="1"/>
+          </p:cNvSpPr>
+          <p:nvPr>
+            <p:ph type="title"/>
+          </p:nvPr>
+        </p:nvSpPr>
+        <p:spPr/>
+        <p:txBody>
+          <a:bodyPr/>
+          <a:lstStyle/>
+          <a:p>
+            <a:r>
+              <a:rPr lang="en-GB" dirty="0"/>
+              <a:t>Critique of progress so far</a:t>
+            </a:r>
+          </a:p>
+        </p:txBody>
+      </p:sp>
+      <p:sp>
+        <p:nvSpPr>
+          <p:cNvPr id="3" name="TextBox 2">
+            <a:extLst>
+              <a:ext uri="{FF2B5EF4-FFF2-40B4-BE49-F238E27FC236}">
+                <a16:creationId xmlns:a16="http://schemas.microsoft.com/office/drawing/2014/main" id="{DBF0D781-0031-4065-9ABF-25236B6ABB0B}"/>
+              </a:ext>
+            </a:extLst>
+          </p:cNvPr>
+          <p:cNvSpPr txBox="1"/>
+          <p:nvPr/>
+        </p:nvSpPr>
+        <p:spPr>
+          <a:xfrm>
+            <a:off x="816746" y="1553592"/>
+            <a:ext cx="10238474" cy="1477328"/>
+          </a:xfrm>
+          <a:prstGeom prst="rect">
+            <a:avLst/>
+          </a:prstGeom>
+          <a:noFill/>
+        </p:spPr>
+        <p:txBody>
+          <a:bodyPr wrap="square" rtlCol="0">
+            <a:spAutoFit/>
+          </a:bodyPr>
+          <a:lstStyle/>
+          <a:p>
+            <a:pPr marL="285750" indent="-285750">
+              <a:buFont typeface="Arial" panose="020B0604020202020204" pitchFamily="34" charset="0"/>
+              <a:buChar char="•"/>
+            </a:pPr>
+            <a:r>
+              <a:rPr lang="en-GB" dirty="0">
+                <a:solidFill>
+                  <a:schemeClr val="bg1"/>
+                </a:solidFill>
+              </a:rPr>
+              <a:t>Good progress has been made to implement planned functionality, the project is on course, stage 1 functionality is complete, stage 2 is progressing well</a:t>
+            </a:r>
+          </a:p>
+          <a:p>
+            <a:pPr marL="285750" indent="-285750">
+              <a:buFont typeface="Arial" panose="020B0604020202020204" pitchFamily="34" charset="0"/>
+              <a:buChar char="•"/>
+            </a:pPr>
+            <a:r>
+              <a:rPr lang="en-GB" dirty="0">
+                <a:solidFill>
+                  <a:schemeClr val="bg1"/>
+                </a:solidFill>
+              </a:rPr>
+              <a:t>More work will be done on HCI testing, although there has been an initial review</a:t>
+            </a:r>
+          </a:p>
+          <a:p>
+            <a:pPr marL="285750" indent="-285750">
+              <a:buFont typeface="Arial" panose="020B0604020202020204" pitchFamily="34" charset="0"/>
+              <a:buChar char="•"/>
+            </a:pPr>
+            <a:r>
+              <a:rPr lang="en-GB" dirty="0">
+                <a:solidFill>
+                  <a:schemeClr val="bg1"/>
+                </a:solidFill>
+              </a:rPr>
+              <a:t>We have adapted our coding approach to try to finish individually assigned elements in the first week of the sprint, and leave integration and paired programming for the second week</a:t>
+            </a:r>
+          </a:p>
+        </p:txBody>
+      </p:sp>
+    </p:spTree>
+    <p:extLst>
+      <p:ext uri="{BB962C8B-B14F-4D97-AF65-F5344CB8AC3E}">
+        <p14:creationId xmlns:p14="http://schemas.microsoft.com/office/powerpoint/2010/main" val="4231091809"/>
+      </p:ext>
+    </p:extLst>
+  </p:cSld>
+  <p:clrMapOvr>
+    <a:masterClrMapping/>
+  </p:clrMapOvr>
+</p:sld>
+</file>
+
+<file path=ppt/slides/slide2.xml><?xml version="1.0" encoding="utf-8"?>
+<p:sld xmlns:a="http://schemas.openxmlformats.org/drawingml/2006/main" xmlns:r="http://schemas.openxmlformats.org/officeDocument/2006/relationships" xmlns:p="http://schemas.openxmlformats.org/presentationml/2006/main">
+  <p:cSld>
+    <p:bg>
+      <p:bgPr>
+        <a:gradFill>
+          <a:gsLst>
+            <a:gs pos="100000">
+              <a:schemeClr val="accent1">
+                <a:lumMod val="75000"/>
+              </a:schemeClr>
+            </a:gs>
+            <a:gs pos="0">
+              <a:schemeClr val="accent5">
+                <a:lumMod val="75000"/>
+              </a:schemeClr>
+            </a:gs>
+          </a:gsLst>
+          <a:lin ang="5400000" scaled="1"/>
+        </a:gradFill>
+        <a:effectLst/>
+      </p:bgPr>
+    </p:bg>
+    <p:spTree>
+      <p:nvGrpSpPr>
+        <p:cNvPr id="1" name=""/>
+        <p:cNvGrpSpPr/>
+        <p:nvPr/>
+      </p:nvGrpSpPr>
+      <p:grpSpPr>
+        <a:xfrm>
+          <a:off x="0" y="0"/>
+          <a:ext cx="0" cy="0"/>
+          <a:chOff x="0" y="0"/>
+          <a:chExt cx="0" cy="0"/>
+        </a:xfrm>
+      </p:grpSpPr>
+      <p:sp>
+        <p:nvSpPr>
+          <p:cNvPr id="2" name="Title 1">
+            <a:extLst>
+              <a:ext uri="{FF2B5EF4-FFF2-40B4-BE49-F238E27FC236}">
+                <a16:creationId xmlns:a16="http://schemas.microsoft.com/office/drawing/2014/main" id="{216148B8-4A95-4037-B7D4-76265D2FB619}"/>
+              </a:ext>
+            </a:extLst>
+          </p:cNvPr>
+          <p:cNvSpPr>
+            <a:spLocks noGrp="1"/>
+          </p:cNvSpPr>
+          <p:nvPr>
+            <p:ph type="title"/>
+          </p:nvPr>
+        </p:nvSpPr>
+        <p:spPr/>
+        <p:txBody>
+          <a:bodyPr/>
+          <a:lstStyle/>
+          <a:p>
+            <a:r>
+              <a:rPr lang="en-GB" dirty="0"/>
+              <a:t>Product Goals</a:t>
+            </a:r>
+          </a:p>
+        </p:txBody>
+      </p:sp>
+      <p:sp>
+        <p:nvSpPr>
+          <p:cNvPr id="3" name="Content Placeholder 2">
+            <a:extLst>
+              <a:ext uri="{FF2B5EF4-FFF2-40B4-BE49-F238E27FC236}">
+                <a16:creationId xmlns:a16="http://schemas.microsoft.com/office/drawing/2014/main" id="{264304DE-53D7-4CD9-872D-3AEE70838F33}"/>
+              </a:ext>
+            </a:extLst>
+          </p:cNvPr>
+          <p:cNvSpPr>
+            <a:spLocks noGrp="1"/>
+          </p:cNvSpPr>
+          <p:nvPr>
+            <p:ph idx="1"/>
+          </p:nvPr>
+        </p:nvSpPr>
+        <p:spPr/>
+        <p:txBody>
+          <a:bodyPr/>
+          <a:lstStyle/>
+          <a:p>
+            <a:r>
+              <a:rPr lang="en-GB" dirty="0"/>
+              <a:t>A flight application so customers can search for, book, pay for and cancel flights</a:t>
+            </a:r>
+          </a:p>
+          <a:p>
+            <a:r>
+              <a:rPr lang="en-GB" dirty="0"/>
+              <a:t>Administrators can create and remove flights; they can also view the audit log, send secure messages to customers and run statistics for business purposes</a:t>
+            </a:r>
+          </a:p>
+          <a:p>
+            <a:endParaRPr lang="en-GB" dirty="0"/>
+          </a:p>
+        </p:txBody>
+      </p:sp>
+    </p:spTree>
+    <p:extLst>
+      <p:ext uri="{BB962C8B-B14F-4D97-AF65-F5344CB8AC3E}">
+        <p14:creationId xmlns:p14="http://schemas.microsoft.com/office/powerpoint/2010/main" val="1117230992"/>
+      </p:ext>
+    </p:extLst>
+  </p:cSld>
+  <p:clrMapOvr>
+    <a:overrideClrMapping bg1="lt1" tx1="dk1" bg2="lt2" tx2="dk2" accent1="accent1" accent2="accent2" accent3="accent3" accent4="accent4" accent5="accent5" accent6="accent6" hlink="hlink" folHlink="folHlink"/>
+  </p:clrMapOvr>
+</p:sld>
+</file>
+
+<file path=ppt/slides/slide20.xml><?xml version="1.0" encoding="utf-8"?>
 <p:sld xmlns:a="http://schemas.openxmlformats.org/drawingml/2006/main" xmlns:r="http://schemas.openxmlformats.org/officeDocument/2006/relationships" xmlns:p="http://schemas.openxmlformats.org/presentationml/2006/main">
   <p:cSld>
     <p:spTree>
@@ -6648,122 +6893,7 @@
 </p:sld>
 </file>
 
-<file path=ppt/slides/slide2.xml><?xml version="1.0" encoding="utf-8"?>
-<p:sld xmlns:a="http://schemas.openxmlformats.org/drawingml/2006/main" xmlns:r="http://schemas.openxmlformats.org/officeDocument/2006/relationships" xmlns:p="http://schemas.openxmlformats.org/presentationml/2006/main">
-  <p:cSld>
-    <p:bg>
-      <p:bgPr>
-        <a:gradFill>
-          <a:gsLst>
-            <a:gs pos="100000">
-              <a:schemeClr val="accent1">
-                <a:lumMod val="75000"/>
-              </a:schemeClr>
-            </a:gs>
-            <a:gs pos="0">
-              <a:schemeClr val="accent5">
-                <a:lumMod val="75000"/>
-              </a:schemeClr>
-            </a:gs>
-          </a:gsLst>
-          <a:lin ang="5400000" scaled="1"/>
-        </a:gradFill>
-        <a:effectLst/>
-      </p:bgPr>
-    </p:bg>
-    <p:spTree>
-      <p:nvGrpSpPr>
-        <p:cNvPr id="1" name=""/>
-        <p:cNvGrpSpPr/>
-        <p:nvPr/>
-      </p:nvGrpSpPr>
-      <p:grpSpPr>
-        <a:xfrm>
-          <a:off x="0" y="0"/>
-          <a:ext cx="0" cy="0"/>
-          <a:chOff x="0" y="0"/>
-          <a:chExt cx="0" cy="0"/>
-        </a:xfrm>
-      </p:grpSpPr>
-      <p:sp>
-        <p:nvSpPr>
-          <p:cNvPr id="2" name="Title 1">
-            <a:extLst>
-              <a:ext uri="{FF2B5EF4-FFF2-40B4-BE49-F238E27FC236}">
-                <a16:creationId xmlns:a16="http://schemas.microsoft.com/office/drawing/2014/main" id="{216148B8-4A95-4037-B7D4-76265D2FB619}"/>
-              </a:ext>
-            </a:extLst>
-          </p:cNvPr>
-          <p:cNvSpPr>
-            <a:spLocks noGrp="1"/>
-          </p:cNvSpPr>
-          <p:nvPr>
-            <p:ph type="title"/>
-          </p:nvPr>
-        </p:nvSpPr>
-        <p:spPr/>
-        <p:txBody>
-          <a:bodyPr/>
-          <a:lstStyle/>
-          <a:p>
-            <a:r>
-              <a:rPr lang="en-GB" dirty="0"/>
-              <a:t>Product Goals</a:t>
-            </a:r>
-          </a:p>
-        </p:txBody>
-      </p:sp>
-      <p:sp>
-        <p:nvSpPr>
-          <p:cNvPr id="3" name="Content Placeholder 2">
-            <a:extLst>
-              <a:ext uri="{FF2B5EF4-FFF2-40B4-BE49-F238E27FC236}">
-                <a16:creationId xmlns:a16="http://schemas.microsoft.com/office/drawing/2014/main" id="{264304DE-53D7-4CD9-872D-3AEE70838F33}"/>
-              </a:ext>
-            </a:extLst>
-          </p:cNvPr>
-          <p:cNvSpPr>
-            <a:spLocks noGrp="1"/>
-          </p:cNvSpPr>
-          <p:nvPr>
-            <p:ph idx="1"/>
-          </p:nvPr>
-        </p:nvSpPr>
-        <p:spPr/>
-        <p:txBody>
-          <a:bodyPr/>
-          <a:lstStyle/>
-          <a:p>
-            <a:r>
-              <a:rPr lang="en-GB" dirty="0"/>
-              <a:t>A flight application so customers can search for, book, pay for and cancel flights</a:t>
-            </a:r>
-          </a:p>
-          <a:p>
-            <a:r>
-              <a:rPr lang="en-GB" dirty="0"/>
-              <a:t>Administrators can create and remove flights; they can also view the audit log, send secure messages to customers and run statistics for business purposes</a:t>
-            </a:r>
-          </a:p>
-          <a:p>
-            <a:endParaRPr lang="en-GB" dirty="0"/>
-          </a:p>
-        </p:txBody>
-      </p:sp>
-    </p:spTree>
-    <p:extLst>
-      <p:ext uri="{BB962C8B-B14F-4D97-AF65-F5344CB8AC3E}">
-        <p14:creationId xmlns:p14="http://schemas.microsoft.com/office/powerpoint/2010/main" val="1117230992"/>
-      </p:ext>
-    </p:extLst>
-  </p:cSld>
-  <p:clrMapOvr>
-    <a:overrideClrMapping bg1="lt1" tx1="dk1" bg2="lt2" tx2="dk2" accent1="accent1" accent2="accent2" accent3="accent3" accent4="accent4" accent5="accent5" accent6="accent6" hlink="hlink" folHlink="folHlink"/>
-  </p:clrMapOvr>
-</p:sld>
-</file>
-
-<file path=ppt/slides/slide20.xml><?xml version="1.0" encoding="utf-8"?>
+<file path=ppt/slides/slide21.xml><?xml version="1.0" encoding="utf-8"?>
 <p:sld xmlns:a="http://schemas.openxmlformats.org/drawingml/2006/main" xmlns:r="http://schemas.openxmlformats.org/officeDocument/2006/relationships" xmlns:p="http://schemas.openxmlformats.org/presentationml/2006/main">
   <p:cSld>
     <p:spTree>
@@ -6805,31 +6935,6 @@
               <a:rPr lang="en-GB" dirty="0"/>
               <a:t>Any Questions?</a:t>
             </a:r>
-          </a:p>
-        </p:txBody>
-      </p:sp>
-      <p:sp>
-        <p:nvSpPr>
-          <p:cNvPr id="3" name="Content Placeholder 2">
-            <a:extLst>
-              <a:ext uri="{FF2B5EF4-FFF2-40B4-BE49-F238E27FC236}">
-                <a16:creationId xmlns:a16="http://schemas.microsoft.com/office/drawing/2014/main" id="{21551801-6E35-4AE8-9365-B7095D79B5F7}"/>
-              </a:ext>
-            </a:extLst>
-          </p:cNvPr>
-          <p:cNvSpPr>
-            <a:spLocks noGrp="1"/>
-          </p:cNvSpPr>
-          <p:nvPr>
-            <p:ph idx="1"/>
-          </p:nvPr>
-        </p:nvSpPr>
-        <p:spPr/>
-        <p:txBody>
-          <a:bodyPr/>
-          <a:lstStyle/>
-          <a:p>
-            <a:endParaRPr lang="en-GB"/>
           </a:p>
         </p:txBody>
       </p:sp>
@@ -7118,7 +7223,7 @@
           <a:p>
             <a:r>
               <a:rPr lang="en-GB" dirty="0"/>
-              <a:t>Spring 4 – review, refine, write reports</a:t>
+              <a:t>Sprint 4 – review, refine, write reports</a:t>
             </a:r>
           </a:p>
           <a:p>

</xml_diff>